<commit_message>
update slides in week 3 of computer and network
</commit_message>
<xml_diff>
--- a/cits1003-lecture_slides/CITS1003-3 NetworkAndComputers-exercises.pptx
+++ b/cits1003-lecture_slides/CITS1003-3 NetworkAndComputers-exercises.pptx
@@ -5,7 +5,7 @@
     <p:sldMasterId id="2147483763" r:id="rId1"/>
   </p:sldMasterIdLst>
   <p:notesMasterIdLst>
-    <p:notesMasterId r:id="rId37"/>
+    <p:notesMasterId r:id="rId33"/>
   </p:notesMasterIdLst>
   <p:sldIdLst>
     <p:sldId id="256" r:id="rId2"/>
@@ -39,10 +39,6 @@
     <p:sldId id="492" r:id="rId30"/>
     <p:sldId id="520" r:id="rId31"/>
     <p:sldId id="521" r:id="rId32"/>
-    <p:sldId id="523" r:id="rId33"/>
-    <p:sldId id="328" r:id="rId34"/>
-    <p:sldId id="522" r:id="rId35"/>
-    <p:sldId id="524" r:id="rId36"/>
   </p:sldIdLst>
   <p:sldSz cx="12192000" cy="6858000"/>
   <p:notesSz cx="6858000" cy="9144000"/>
@@ -163,6 +159,37 @@
 
 <file path=ppt/changesInfos/changesInfo1.xml><?xml version="1.0" encoding="utf-8"?>
 <pc:chgInfo xmlns:a="http://schemas.openxmlformats.org/drawingml/2006/main" xmlns:r="http://schemas.openxmlformats.org/officeDocument/2006/relationships" xmlns:ac="http://schemas.microsoft.com/office/drawing/2013/main/command" xmlns:pc="http://schemas.microsoft.com/office/powerpoint/2013/main/command">
+  <pc:docChgLst>
+    <pc:chgData name="张 智" userId="36bdf691fd3510be" providerId="LiveId" clId="{140A1199-8952-4C15-ACCA-8E993F5FBFC6}"/>
+    <pc:docChg chg="custSel modSld">
+      <pc:chgData name="张 智" userId="36bdf691fd3510be" providerId="LiveId" clId="{140A1199-8952-4C15-ACCA-8E993F5FBFC6}" dt="2024-03-09T14:02:11.769" v="16" actId="20577"/>
+      <pc:docMkLst>
+        <pc:docMk/>
+      </pc:docMkLst>
+      <pc:sldChg chg="modNotesTx">
+        <pc:chgData name="张 智" userId="36bdf691fd3510be" providerId="LiveId" clId="{140A1199-8952-4C15-ACCA-8E993F5FBFC6}" dt="2024-03-09T14:02:11.769" v="16" actId="20577"/>
+        <pc:sldMkLst>
+          <pc:docMk/>
+          <pc:sldMk cId="523072554" sldId="408"/>
+        </pc:sldMkLst>
+      </pc:sldChg>
+      <pc:sldChg chg="modSp mod modNotesTx">
+        <pc:chgData name="张 智" userId="36bdf691fd3510be" providerId="LiveId" clId="{140A1199-8952-4C15-ACCA-8E993F5FBFC6}" dt="2024-03-09T13:55:47.879" v="2" actId="20577"/>
+        <pc:sldMkLst>
+          <pc:docMk/>
+          <pc:sldMk cId="2206519697" sldId="500"/>
+        </pc:sldMkLst>
+        <pc:spChg chg="mod">
+          <ac:chgData name="张 智" userId="36bdf691fd3510be" providerId="LiveId" clId="{140A1199-8952-4C15-ACCA-8E993F5FBFC6}" dt="2024-03-09T13:55:47.879" v="2" actId="20577"/>
+          <ac:spMkLst>
+            <pc:docMk/>
+            <pc:sldMk cId="2206519697" sldId="500"/>
+            <ac:spMk id="3" creationId="{1DAD7D02-86A3-4809-8C4D-190E2BE21D21}"/>
+          </ac:spMkLst>
+        </pc:spChg>
+      </pc:sldChg>
+    </pc:docChg>
+  </pc:docChgLst>
   <pc:docChgLst>
     <pc:chgData name="张 智" userId="36bdf691fd3510be" providerId="LiveId" clId="{F705E205-9FD5-47F2-BF62-84F5EA79DD05}"/>
     <pc:docChg chg="undo custSel addSld modSld">
@@ -896,7 +923,7 @@
           <a:p>
             <a:fld id="{6D6D7260-B7E4-B548-BD1F-84ED14536037}" type="datetimeFigureOut">
               <a:rPr lang="en-AU" smtClean="0"/>
-              <a:t>13/03/2023</a:t>
+              <a:t>9/03/2024</a:t>
             </a:fld>
             <a:endParaRPr lang="en-AU"/>
           </a:p>
@@ -3383,395 +3410,6 @@
 </p:notes>
 </file>
 
-<file path=ppt/notesSlides/notesSlide32.xml><?xml version="1.0" encoding="utf-8"?>
-<p:notes xmlns:a="http://schemas.openxmlformats.org/drawingml/2006/main" xmlns:r="http://schemas.openxmlformats.org/officeDocument/2006/relationships" xmlns:p="http://schemas.openxmlformats.org/presentationml/2006/main">
-  <p:cSld>
-    <p:spTree>
-      <p:nvGrpSpPr>
-        <p:cNvPr id="1" name=""/>
-        <p:cNvGrpSpPr/>
-        <p:nvPr/>
-      </p:nvGrpSpPr>
-      <p:grpSpPr>
-        <a:xfrm>
-          <a:off x="0" y="0"/>
-          <a:ext cx="0" cy="0"/>
-          <a:chOff x="0" y="0"/>
-          <a:chExt cx="0" cy="0"/>
-        </a:xfrm>
-      </p:grpSpPr>
-      <p:sp>
-        <p:nvSpPr>
-          <p:cNvPr id="2" name="Slide Image Placeholder 1"/>
-          <p:cNvSpPr>
-            <a:spLocks noGrp="1" noRot="1" noChangeAspect="1"/>
-          </p:cNvSpPr>
-          <p:nvPr>
-            <p:ph type="sldImg"/>
-          </p:nvPr>
-        </p:nvSpPr>
-        <p:spPr/>
-      </p:sp>
-      <p:sp>
-        <p:nvSpPr>
-          <p:cNvPr id="3" name="Notes Placeholder 2"/>
-          <p:cNvSpPr>
-            <a:spLocks noGrp="1"/>
-          </p:cNvSpPr>
-          <p:nvPr>
-            <p:ph type="body" idx="1"/>
-          </p:nvPr>
-        </p:nvSpPr>
-        <p:spPr/>
-        <p:txBody>
-          <a:bodyPr/>
-          <a:lstStyle/>
-          <a:p>
-            <a:pPr marL="0" marR="0" lvl="0" indent="0" algn="l" defTabSz="914400" rtl="0" eaLnBrk="1" fontAlgn="auto" latinLnBrk="0" hangingPunct="1">
-              <a:lnSpc>
-                <a:spcPct val="100000"/>
-              </a:lnSpc>
-              <a:spcBef>
-                <a:spcPts val="0"/>
-              </a:spcBef>
-              <a:spcAft>
-                <a:spcPts val="0"/>
-              </a:spcAft>
-              <a:buClrTx/>
-              <a:buSzTx/>
-              <a:buFontTx/>
-              <a:buNone/>
-              <a:tabLst/>
-              <a:defRPr/>
-            </a:pPr>
-            <a:endParaRPr lang="en-AU" dirty="0"/>
-          </a:p>
-        </p:txBody>
-      </p:sp>
-      <p:sp>
-        <p:nvSpPr>
-          <p:cNvPr id="4" name="Slide Number Placeholder 3"/>
-          <p:cNvSpPr>
-            <a:spLocks noGrp="1"/>
-          </p:cNvSpPr>
-          <p:nvPr>
-            <p:ph type="sldNum" sz="quarter" idx="5"/>
-          </p:nvPr>
-        </p:nvSpPr>
-        <p:spPr/>
-        <p:txBody>
-          <a:bodyPr/>
-          <a:lstStyle/>
-          <a:p>
-            <a:fld id="{DF030C05-EF6C-9847-8923-580D76870F8E}" type="slidenum">
-              <a:rPr lang="en-AU" smtClean="0"/>
-              <a:t>32</a:t>
-            </a:fld>
-            <a:endParaRPr lang="en-AU"/>
-          </a:p>
-        </p:txBody>
-      </p:sp>
-    </p:spTree>
-    <p:extLst>
-      <p:ext uri="{BB962C8B-B14F-4D97-AF65-F5344CB8AC3E}">
-        <p14:creationId xmlns:p14="http://schemas.microsoft.com/office/powerpoint/2010/main" val="1713442991"/>
-      </p:ext>
-    </p:extLst>
-  </p:cSld>
-  <p:clrMapOvr>
-    <a:masterClrMapping/>
-  </p:clrMapOvr>
-</p:notes>
-</file>
-
-<file path=ppt/notesSlides/notesSlide33.xml><?xml version="1.0" encoding="utf-8"?>
-<p:notes xmlns:a="http://schemas.openxmlformats.org/drawingml/2006/main" xmlns:r="http://schemas.openxmlformats.org/officeDocument/2006/relationships" xmlns:p="http://schemas.openxmlformats.org/presentationml/2006/main">
-  <p:cSld>
-    <p:spTree>
-      <p:nvGrpSpPr>
-        <p:cNvPr id="1" name=""/>
-        <p:cNvGrpSpPr/>
-        <p:nvPr/>
-      </p:nvGrpSpPr>
-      <p:grpSpPr>
-        <a:xfrm>
-          <a:off x="0" y="0"/>
-          <a:ext cx="0" cy="0"/>
-          <a:chOff x="0" y="0"/>
-          <a:chExt cx="0" cy="0"/>
-        </a:xfrm>
-      </p:grpSpPr>
-      <p:sp>
-        <p:nvSpPr>
-          <p:cNvPr id="2" name="Slide Image Placeholder 1"/>
-          <p:cNvSpPr>
-            <a:spLocks noGrp="1" noRot="1" noChangeAspect="1"/>
-          </p:cNvSpPr>
-          <p:nvPr>
-            <p:ph type="sldImg"/>
-          </p:nvPr>
-        </p:nvSpPr>
-        <p:spPr/>
-      </p:sp>
-      <p:sp>
-        <p:nvSpPr>
-          <p:cNvPr id="3" name="Notes Placeholder 2"/>
-          <p:cNvSpPr>
-            <a:spLocks noGrp="1"/>
-          </p:cNvSpPr>
-          <p:nvPr>
-            <p:ph type="body" idx="1"/>
-          </p:nvPr>
-        </p:nvSpPr>
-        <p:spPr/>
-        <p:txBody>
-          <a:bodyPr/>
-          <a:lstStyle/>
-          <a:p>
-            <a:pPr marL="36900" marR="0" lvl="0" indent="0" algn="l" defTabSz="914400" rtl="0" eaLnBrk="1" fontAlgn="auto" latinLnBrk="0" hangingPunct="1">
-              <a:lnSpc>
-                <a:spcPct val="100000"/>
-              </a:lnSpc>
-              <a:spcBef>
-                <a:spcPts val="0"/>
-              </a:spcBef>
-              <a:spcAft>
-                <a:spcPts val="0"/>
-              </a:spcAft>
-              <a:buClr>
-                <a:srgbClr val="A629E7"/>
-              </a:buClr>
-              <a:buSzTx/>
-              <a:buFontTx/>
-              <a:buNone/>
-              <a:tabLst/>
-              <a:defRPr/>
-            </a:pPr>
-            <a:endParaRPr lang="en-AU" dirty="0"/>
-          </a:p>
-        </p:txBody>
-      </p:sp>
-      <p:sp>
-        <p:nvSpPr>
-          <p:cNvPr id="4" name="Slide Number Placeholder 3"/>
-          <p:cNvSpPr>
-            <a:spLocks noGrp="1"/>
-          </p:cNvSpPr>
-          <p:nvPr>
-            <p:ph type="sldNum" sz="quarter" idx="5"/>
-          </p:nvPr>
-        </p:nvSpPr>
-        <p:spPr/>
-        <p:txBody>
-          <a:bodyPr/>
-          <a:lstStyle/>
-          <a:p>
-            <a:fld id="{DF030C05-EF6C-9847-8923-580D76870F8E}" type="slidenum">
-              <a:rPr lang="en-AU" smtClean="0"/>
-              <a:t>33</a:t>
-            </a:fld>
-            <a:endParaRPr lang="en-AU"/>
-          </a:p>
-        </p:txBody>
-      </p:sp>
-    </p:spTree>
-    <p:extLst>
-      <p:ext uri="{BB962C8B-B14F-4D97-AF65-F5344CB8AC3E}">
-        <p14:creationId xmlns:p14="http://schemas.microsoft.com/office/powerpoint/2010/main" val="4294081082"/>
-      </p:ext>
-    </p:extLst>
-  </p:cSld>
-  <p:clrMapOvr>
-    <a:masterClrMapping/>
-  </p:clrMapOvr>
-</p:notes>
-</file>
-
-<file path=ppt/notesSlides/notesSlide34.xml><?xml version="1.0" encoding="utf-8"?>
-<p:notes xmlns:a="http://schemas.openxmlformats.org/drawingml/2006/main" xmlns:r="http://schemas.openxmlformats.org/officeDocument/2006/relationships" xmlns:p="http://schemas.openxmlformats.org/presentationml/2006/main">
-  <p:cSld>
-    <p:spTree>
-      <p:nvGrpSpPr>
-        <p:cNvPr id="1" name=""/>
-        <p:cNvGrpSpPr/>
-        <p:nvPr/>
-      </p:nvGrpSpPr>
-      <p:grpSpPr>
-        <a:xfrm>
-          <a:off x="0" y="0"/>
-          <a:ext cx="0" cy="0"/>
-          <a:chOff x="0" y="0"/>
-          <a:chExt cx="0" cy="0"/>
-        </a:xfrm>
-      </p:grpSpPr>
-      <p:sp>
-        <p:nvSpPr>
-          <p:cNvPr id="2" name="Slide Image Placeholder 1"/>
-          <p:cNvSpPr>
-            <a:spLocks noGrp="1" noRot="1" noChangeAspect="1"/>
-          </p:cNvSpPr>
-          <p:nvPr>
-            <p:ph type="sldImg"/>
-          </p:nvPr>
-        </p:nvSpPr>
-        <p:spPr/>
-      </p:sp>
-      <p:sp>
-        <p:nvSpPr>
-          <p:cNvPr id="3" name="Notes Placeholder 2"/>
-          <p:cNvSpPr>
-            <a:spLocks noGrp="1"/>
-          </p:cNvSpPr>
-          <p:nvPr>
-            <p:ph type="body" idx="1"/>
-          </p:nvPr>
-        </p:nvSpPr>
-        <p:spPr/>
-        <p:txBody>
-          <a:bodyPr/>
-          <a:lstStyle/>
-          <a:p>
-            <a:endParaRPr lang="en-US" dirty="0"/>
-          </a:p>
-        </p:txBody>
-      </p:sp>
-      <p:sp>
-        <p:nvSpPr>
-          <p:cNvPr id="4" name="Slide Number Placeholder 3"/>
-          <p:cNvSpPr>
-            <a:spLocks noGrp="1"/>
-          </p:cNvSpPr>
-          <p:nvPr>
-            <p:ph type="sldNum" sz="quarter" idx="5"/>
-          </p:nvPr>
-        </p:nvSpPr>
-        <p:spPr/>
-        <p:txBody>
-          <a:bodyPr/>
-          <a:lstStyle/>
-          <a:p>
-            <a:fld id="{DF030C05-EF6C-9847-8923-580D76870F8E}" type="slidenum">
-              <a:rPr lang="en-AU" smtClean="0"/>
-              <a:t>34</a:t>
-            </a:fld>
-            <a:endParaRPr lang="en-AU"/>
-          </a:p>
-        </p:txBody>
-      </p:sp>
-    </p:spTree>
-    <p:extLst>
-      <p:ext uri="{BB962C8B-B14F-4D97-AF65-F5344CB8AC3E}">
-        <p14:creationId xmlns:p14="http://schemas.microsoft.com/office/powerpoint/2010/main" val="2579100851"/>
-      </p:ext>
-    </p:extLst>
-  </p:cSld>
-  <p:clrMapOvr>
-    <a:masterClrMapping/>
-  </p:clrMapOvr>
-</p:notes>
-</file>
-
-<file path=ppt/notesSlides/notesSlide35.xml><?xml version="1.0" encoding="utf-8"?>
-<p:notes xmlns:a="http://schemas.openxmlformats.org/drawingml/2006/main" xmlns:r="http://schemas.openxmlformats.org/officeDocument/2006/relationships" xmlns:p="http://schemas.openxmlformats.org/presentationml/2006/main">
-  <p:cSld>
-    <p:spTree>
-      <p:nvGrpSpPr>
-        <p:cNvPr id="1" name=""/>
-        <p:cNvGrpSpPr/>
-        <p:nvPr/>
-      </p:nvGrpSpPr>
-      <p:grpSpPr>
-        <a:xfrm>
-          <a:off x="0" y="0"/>
-          <a:ext cx="0" cy="0"/>
-          <a:chOff x="0" y="0"/>
-          <a:chExt cx="0" cy="0"/>
-        </a:xfrm>
-      </p:grpSpPr>
-      <p:sp>
-        <p:nvSpPr>
-          <p:cNvPr id="2" name="Slide Image Placeholder 1"/>
-          <p:cNvSpPr>
-            <a:spLocks noGrp="1" noRot="1" noChangeAspect="1"/>
-          </p:cNvSpPr>
-          <p:nvPr>
-            <p:ph type="sldImg"/>
-          </p:nvPr>
-        </p:nvSpPr>
-        <p:spPr/>
-      </p:sp>
-      <p:sp>
-        <p:nvSpPr>
-          <p:cNvPr id="3" name="Notes Placeholder 2"/>
-          <p:cNvSpPr>
-            <a:spLocks noGrp="1"/>
-          </p:cNvSpPr>
-          <p:nvPr>
-            <p:ph type="body" idx="1"/>
-          </p:nvPr>
-        </p:nvSpPr>
-        <p:spPr/>
-        <p:txBody>
-          <a:bodyPr/>
-          <a:lstStyle/>
-          <a:p>
-            <a:pPr marL="0" marR="0" lvl="0" indent="0" algn="l" defTabSz="914400" rtl="0" eaLnBrk="1" fontAlgn="auto" latinLnBrk="0" hangingPunct="1">
-              <a:lnSpc>
-                <a:spcPct val="100000"/>
-              </a:lnSpc>
-              <a:spcBef>
-                <a:spcPts val="0"/>
-              </a:spcBef>
-              <a:spcAft>
-                <a:spcPts val="0"/>
-              </a:spcAft>
-              <a:buClrTx/>
-              <a:buSzTx/>
-              <a:buFontTx/>
-              <a:buNone/>
-              <a:tabLst/>
-              <a:defRPr/>
-            </a:pPr>
-            <a:endParaRPr lang="en-US" dirty="0"/>
-          </a:p>
-        </p:txBody>
-      </p:sp>
-      <p:sp>
-        <p:nvSpPr>
-          <p:cNvPr id="4" name="Slide Number Placeholder 3"/>
-          <p:cNvSpPr>
-            <a:spLocks noGrp="1"/>
-          </p:cNvSpPr>
-          <p:nvPr>
-            <p:ph type="sldNum" sz="quarter" idx="5"/>
-          </p:nvPr>
-        </p:nvSpPr>
-        <p:spPr/>
-        <p:txBody>
-          <a:bodyPr/>
-          <a:lstStyle/>
-          <a:p>
-            <a:fld id="{DF030C05-EF6C-9847-8923-580D76870F8E}" type="slidenum">
-              <a:rPr lang="en-AU" smtClean="0"/>
-              <a:t>35</a:t>
-            </a:fld>
-            <a:endParaRPr lang="en-AU"/>
-          </a:p>
-        </p:txBody>
-      </p:sp>
-    </p:spTree>
-    <p:extLst>
-      <p:ext uri="{BB962C8B-B14F-4D97-AF65-F5344CB8AC3E}">
-        <p14:creationId xmlns:p14="http://schemas.microsoft.com/office/powerpoint/2010/main" val="3339125524"/>
-      </p:ext>
-    </p:extLst>
-  </p:cSld>
-  <p:clrMapOvr>
-    <a:masterClrMapping/>
-  </p:clrMapOvr>
-</p:notes>
-</file>
-
 <file path=ppt/notesSlides/notesSlide4.xml><?xml version="1.0" encoding="utf-8"?>
 <p:notes xmlns:a="http://schemas.openxmlformats.org/drawingml/2006/main" xmlns:r="http://schemas.openxmlformats.org/officeDocument/2006/relationships" xmlns:p="http://schemas.openxmlformats.org/presentationml/2006/main">
   <p:cSld>
@@ -4461,7 +4099,7 @@
           <a:p>
             <a:fld id="{88D38747-4367-4BD2-8D51-C97E202738E2}" type="datetime1">
               <a:rPr lang="en-US" smtClean="0"/>
-              <a:t>3/13/2023</a:t>
+              <a:t>3/9/2024</a:t>
             </a:fld>
             <a:endParaRPr lang="en-US" dirty="0"/>
           </a:p>
@@ -4766,7 +4404,7 @@
           <a:p>
             <a:fld id="{11F1B079-7EF0-44EE-B798-BCC497C9F3B2}" type="datetime1">
               <a:rPr lang="en-US" smtClean="0"/>
-              <a:t>3/13/2023</a:t>
+              <a:t>3/9/2024</a:t>
             </a:fld>
             <a:endParaRPr lang="en-US" dirty="0"/>
           </a:p>
@@ -4960,7 +4598,7 @@
           <a:p>
             <a:fld id="{28FF70A8-1D13-4657-95F0-A9EA54967B8D}" type="datetime1">
               <a:rPr lang="en-US" smtClean="0"/>
-              <a:t>3/13/2023</a:t>
+              <a:t>3/9/2024</a:t>
             </a:fld>
             <a:endParaRPr lang="en-US" dirty="0"/>
           </a:p>
@@ -5223,7 +4861,7 @@
           <a:p>
             <a:fld id="{21EB90AC-71BD-4C7F-8ACA-7B3F18292E63}" type="datetime1">
               <a:rPr lang="en-US" smtClean="0"/>
-              <a:t>3/13/2023</a:t>
+              <a:t>3/9/2024</a:t>
             </a:fld>
             <a:endParaRPr lang="en-US" dirty="0"/>
           </a:p>
@@ -5659,7 +5297,7 @@
           <a:p>
             <a:fld id="{4E6EFC2C-8905-46F0-B443-CE905B76BA01}" type="datetime1">
               <a:rPr lang="en-US" smtClean="0"/>
-              <a:t>3/13/2023</a:t>
+              <a:t>3/9/2024</a:t>
             </a:fld>
             <a:endParaRPr lang="en-US" dirty="0"/>
           </a:p>
@@ -6196,7 +5834,7 @@
           <a:p>
             <a:fld id="{D9079DC3-C9B5-499E-9140-0DC28B7074E2}" type="datetime1">
               <a:rPr lang="en-US" smtClean="0"/>
-              <a:t>3/13/2023</a:t>
+              <a:t>3/9/2024</a:t>
             </a:fld>
             <a:endParaRPr lang="en-US" dirty="0"/>
           </a:p>
@@ -7078,7 +6716,7 @@
           <a:p>
             <a:fld id="{30BB33EA-E472-4D22-9C03-A9C14AA21CED}" type="datetime1">
               <a:rPr lang="en-US" smtClean="0"/>
-              <a:t>3/13/2023</a:t>
+              <a:t>3/9/2024</a:t>
             </a:fld>
             <a:endParaRPr lang="en-US" dirty="0"/>
           </a:p>
@@ -7248,7 +6886,7 @@
           <a:p>
             <a:fld id="{217E833E-1B6D-415F-AD29-75AE8C43BD0D}" type="datetime1">
               <a:rPr lang="en-US" smtClean="0"/>
-              <a:t>3/13/2023</a:t>
+              <a:t>3/9/2024</a:t>
             </a:fld>
             <a:endParaRPr lang="en-US" dirty="0"/>
           </a:p>
@@ -7432,7 +7070,7 @@
           <a:p>
             <a:fld id="{8452596F-08A7-4B70-989A-F2B1CF31E66B}" type="datetime1">
               <a:rPr lang="en-US" smtClean="0"/>
-              <a:t>3/13/2023</a:t>
+              <a:t>3/9/2024</a:t>
             </a:fld>
             <a:endParaRPr lang="en-US" dirty="0"/>
           </a:p>
@@ -7620,7 +7258,7 @@
           <a:p>
             <a:fld id="{73C55A3C-5767-4844-A0A3-83778C2E5409}" type="datetime1">
               <a:rPr lang="en-US" smtClean="0"/>
-              <a:t>3/13/2023</a:t>
+              <a:t>3/9/2024</a:t>
             </a:fld>
             <a:endParaRPr lang="en-US" dirty="0"/>
           </a:p>
@@ -7864,7 +7502,7 @@
           <a:p>
             <a:fld id="{CAE507A8-A5CF-4D38-AB86-7EDDA87A85D4}" type="datetime1">
               <a:rPr lang="en-US" smtClean="0"/>
-              <a:t>3/13/2023</a:t>
+              <a:t>3/9/2024</a:t>
             </a:fld>
             <a:endParaRPr lang="en-US" dirty="0"/>
           </a:p>
@@ -8106,7 +7744,7 @@
           <a:p>
             <a:fld id="{BDFCD27C-8599-43EF-BA1D-14DDC1946E06}" type="datetime1">
               <a:rPr lang="en-US" smtClean="0"/>
-              <a:t>3/13/2023</a:t>
+              <a:t>3/9/2024</a:t>
             </a:fld>
             <a:endParaRPr lang="en-US" dirty="0"/>
           </a:p>
@@ -8587,7 +8225,7 @@
           <a:p>
             <a:fld id="{49343D99-809A-49C0-96E5-4250D0B498EE}" type="datetime1">
               <a:rPr lang="en-US" smtClean="0"/>
-              <a:t>3/13/2023</a:t>
+              <a:t>3/9/2024</a:t>
             </a:fld>
             <a:endParaRPr lang="en-US" dirty="0"/>
           </a:p>
@@ -8705,7 +8343,7 @@
           <a:p>
             <a:fld id="{A143DE9B-B678-4EFB-BB7D-A4370204A0B0}" type="datetime1">
               <a:rPr lang="en-US" smtClean="0"/>
-              <a:t>3/13/2023</a:t>
+              <a:t>3/9/2024</a:t>
             </a:fld>
             <a:endParaRPr lang="en-US" dirty="0"/>
           </a:p>
@@ -8800,7 +8438,7 @@
           <a:p>
             <a:fld id="{E68812DA-F765-4142-A6A3-A8ED7235E082}" type="datetime1">
               <a:rPr lang="en-US" smtClean="0"/>
-              <a:t>3/13/2023</a:t>
+              <a:t>3/9/2024</a:t>
             </a:fld>
             <a:endParaRPr lang="en-US" dirty="0"/>
           </a:p>
@@ -9055,7 +8693,7 @@
           <a:p>
             <a:fld id="{3E0277FD-7DE6-41D4-930D-AC99F5AFE54E}" type="datetime1">
               <a:rPr lang="en-US" smtClean="0"/>
-              <a:t>3/13/2023</a:t>
+              <a:t>3/9/2024</a:t>
             </a:fld>
             <a:endParaRPr lang="en-US" dirty="0"/>
           </a:p>
@@ -9362,7 +9000,7 @@
           <a:p>
             <a:fld id="{9EA15526-7079-4B7B-987C-1B5FAE11A0FF}" type="datetime1">
               <a:rPr lang="en-US" smtClean="0"/>
-              <a:t>3/13/2023</a:t>
+              <a:t>3/9/2024</a:t>
             </a:fld>
             <a:endParaRPr lang="en-US" dirty="0"/>
           </a:p>
@@ -9597,7 +9235,7 @@
           <a:p>
             <a:fld id="{073ED0CC-082F-4160-86E5-0D6041F12778}" type="datetime1">
               <a:rPr lang="en-US" smtClean="0"/>
-              <a:t>3/13/2023</a:t>
+              <a:t>3/9/2024</a:t>
             </a:fld>
             <a:endParaRPr lang="en-US" dirty="0"/>
           </a:p>
@@ -10508,7 +10146,7 @@
           </a:effectLst>
           <a:extLst>
             <a:ext uri="{91240B29-F687-4f45-9708-019B960494DF}">
-              <a14:hiddenLine xmlns:a16="http://schemas.microsoft.com/office/drawing/2014/main" xmlns:p14="http://schemas.microsoft.com/office/powerpoint/2010/main" xmlns:a14="http://schemas.microsoft.com/office/drawing/2010/main" xmlns="" w="9525">
+              <a14:hiddenLine xmlns="" xmlns:a14="http://schemas.microsoft.com/office/drawing/2010/main" xmlns:p14="http://schemas.microsoft.com/office/powerpoint/2010/main" xmlns:a16="http://schemas.microsoft.com/office/drawing/2014/main" w="9525">
                 <a:solidFill>
                   <a:srgbClr val="000000"/>
                 </a:solidFill>
@@ -10985,6 +10623,92 @@
   <p:clrMapOvr>
     <a:masterClrMapping/>
   </p:clrMapOvr>
+  <p:timing>
+    <p:tnLst>
+      <p:par>
+        <p:cTn id="1" dur="indefinite" restart="never" nodeType="tmRoot">
+          <p:childTnLst>
+            <p:seq concurrent="1" nextAc="seek">
+              <p:cTn id="2" dur="indefinite" nodeType="mainSeq">
+                <p:childTnLst>
+                  <p:par>
+                    <p:cTn id="3" fill="hold">
+                      <p:stCondLst>
+                        <p:cond delay="indefinite"/>
+                      </p:stCondLst>
+                      <p:childTnLst>
+                        <p:par>
+                          <p:cTn id="4" fill="hold">
+                            <p:stCondLst>
+                              <p:cond delay="0"/>
+                            </p:stCondLst>
+                            <p:childTnLst>
+                              <p:par>
+                                <p:cTn id="5" presetID="10" presetClass="entr" presetSubtype="0" fill="hold" grpId="0" nodeType="clickEffect">
+                                  <p:stCondLst>
+                                    <p:cond delay="0"/>
+                                  </p:stCondLst>
+                                  <p:childTnLst>
+                                    <p:set>
+                                      <p:cBhvr>
+                                        <p:cTn id="6" dur="1" fill="hold">
+                                          <p:stCondLst>
+                                            <p:cond delay="0"/>
+                                          </p:stCondLst>
+                                        </p:cTn>
+                                        <p:tgtEl>
+                                          <p:spTgt spid="8"/>
+                                        </p:tgtEl>
+                                        <p:attrNameLst>
+                                          <p:attrName>style.visibility</p:attrName>
+                                        </p:attrNameLst>
+                                      </p:cBhvr>
+                                      <p:to>
+                                        <p:strVal val="visible"/>
+                                      </p:to>
+                                    </p:set>
+                                    <p:animEffect transition="in" filter="fade">
+                                      <p:cBhvr>
+                                        <p:cTn id="7" dur="500"/>
+                                        <p:tgtEl>
+                                          <p:spTgt spid="8"/>
+                                        </p:tgtEl>
+                                      </p:cBhvr>
+                                    </p:animEffect>
+                                  </p:childTnLst>
+                                </p:cTn>
+                              </p:par>
+                            </p:childTnLst>
+                          </p:cTn>
+                        </p:par>
+                      </p:childTnLst>
+                    </p:cTn>
+                  </p:par>
+                </p:childTnLst>
+              </p:cTn>
+              <p:prevCondLst>
+                <p:cond evt="onPrev" delay="0">
+                  <p:tgtEl>
+                    <p:sldTgt/>
+                  </p:tgtEl>
+                </p:cond>
+              </p:prevCondLst>
+              <p:nextCondLst>
+                <p:cond evt="onNext" delay="0">
+                  <p:tgtEl>
+                    <p:sldTgt/>
+                  </p:tgtEl>
+                </p:cond>
+              </p:nextCondLst>
+            </p:seq>
+          </p:childTnLst>
+        </p:cTn>
+      </p:par>
+    </p:tnLst>
+    <p:bldLst>
+      <p:bldP spid="8" grpId="0"/>
+    </p:bldLst>
+  </p:timing>
 </p:sld>
 </file>
 
@@ -12418,6 +12142,92 @@
   <p:clrMapOvr>
     <a:masterClrMapping/>
   </p:clrMapOvr>
+  <p:timing>
+    <p:tnLst>
+      <p:par>
+        <p:cTn id="1" dur="indefinite" restart="never" nodeType="tmRoot">
+          <p:childTnLst>
+            <p:seq concurrent="1" nextAc="seek">
+              <p:cTn id="2" dur="indefinite" nodeType="mainSeq">
+                <p:childTnLst>
+                  <p:par>
+                    <p:cTn id="3" fill="hold">
+                      <p:stCondLst>
+                        <p:cond delay="indefinite"/>
+                      </p:stCondLst>
+                      <p:childTnLst>
+                        <p:par>
+                          <p:cTn id="4" fill="hold">
+                            <p:stCondLst>
+                              <p:cond delay="0"/>
+                            </p:stCondLst>
+                            <p:childTnLst>
+                              <p:par>
+                                <p:cTn id="5" presetID="10" presetClass="entr" presetSubtype="0" fill="hold" grpId="0" nodeType="clickEffect">
+                                  <p:stCondLst>
+                                    <p:cond delay="0"/>
+                                  </p:stCondLst>
+                                  <p:childTnLst>
+                                    <p:set>
+                                      <p:cBhvr>
+                                        <p:cTn id="6" dur="1" fill="hold">
+                                          <p:stCondLst>
+                                            <p:cond delay="0"/>
+                                          </p:stCondLst>
+                                        </p:cTn>
+                                        <p:tgtEl>
+                                          <p:spTgt spid="9"/>
+                                        </p:tgtEl>
+                                        <p:attrNameLst>
+                                          <p:attrName>style.visibility</p:attrName>
+                                        </p:attrNameLst>
+                                      </p:cBhvr>
+                                      <p:to>
+                                        <p:strVal val="visible"/>
+                                      </p:to>
+                                    </p:set>
+                                    <p:animEffect transition="in" filter="fade">
+                                      <p:cBhvr>
+                                        <p:cTn id="7" dur="500"/>
+                                        <p:tgtEl>
+                                          <p:spTgt spid="9"/>
+                                        </p:tgtEl>
+                                      </p:cBhvr>
+                                    </p:animEffect>
+                                  </p:childTnLst>
+                                </p:cTn>
+                              </p:par>
+                            </p:childTnLst>
+                          </p:cTn>
+                        </p:par>
+                      </p:childTnLst>
+                    </p:cTn>
+                  </p:par>
+                </p:childTnLst>
+              </p:cTn>
+              <p:prevCondLst>
+                <p:cond evt="onPrev" delay="0">
+                  <p:tgtEl>
+                    <p:sldTgt/>
+                  </p:tgtEl>
+                </p:cond>
+              </p:prevCondLst>
+              <p:nextCondLst>
+                <p:cond evt="onNext" delay="0">
+                  <p:tgtEl>
+                    <p:sldTgt/>
+                  </p:tgtEl>
+                </p:cond>
+              </p:nextCondLst>
+            </p:seq>
+          </p:childTnLst>
+        </p:cTn>
+      </p:par>
+    </p:tnLst>
+    <p:bldLst>
+      <p:bldP spid="9" grpId="0"/>
+    </p:bldLst>
+  </p:timing>
 </p:sld>
 </file>
 
@@ -12952,10 +12762,7 @@
           </a:p>
           <a:p>
             <a:pPr lvl="1"/>
-            <a:r>
-              <a:rPr lang="en-AU" sz="2800" dirty="0"/>
-              <a:t>Lecture and Lab in Week 2</a:t>
-            </a:r>
+            <a:endParaRPr lang="en-AU" sz="2800" dirty="0"/>
           </a:p>
         </p:txBody>
       </p:sp>
@@ -15008,2491 +14815,6 @@
     <p:extLst>
       <p:ext uri="{BB962C8B-B14F-4D97-AF65-F5344CB8AC3E}">
         <p14:creationId xmlns:p14="http://schemas.microsoft.com/office/powerpoint/2010/main" val="2695140818"/>
-      </p:ext>
-    </p:extLst>
-  </p:cSld>
-  <p:clrMapOvr>
-    <a:masterClrMapping/>
-  </p:clrMapOvr>
-</p:sld>
-</file>
-
-<file path=ppt/slides/slide32.xml><?xml version="1.0" encoding="utf-8"?>
-<p:sld xmlns:a="http://schemas.openxmlformats.org/drawingml/2006/main" xmlns:r="http://schemas.openxmlformats.org/officeDocument/2006/relationships" xmlns:p="http://schemas.openxmlformats.org/presentationml/2006/main">
-  <p:cSld>
-    <p:spTree>
-      <p:nvGrpSpPr>
-        <p:cNvPr id="1" name=""/>
-        <p:cNvGrpSpPr/>
-        <p:nvPr/>
-      </p:nvGrpSpPr>
-      <p:grpSpPr>
-        <a:xfrm>
-          <a:off x="0" y="0"/>
-          <a:ext cx="0" cy="0"/>
-          <a:chOff x="0" y="0"/>
-          <a:chExt cx="0" cy="0"/>
-        </a:xfrm>
-      </p:grpSpPr>
-      <p:sp>
-        <p:nvSpPr>
-          <p:cNvPr id="3" name="Slide Number Placeholder 2"/>
-          <p:cNvSpPr>
-            <a:spLocks noGrp="1"/>
-          </p:cNvSpPr>
-          <p:nvPr>
-            <p:ph type="sldNum" sz="quarter" idx="12"/>
-          </p:nvPr>
-        </p:nvSpPr>
-        <p:spPr/>
-        <p:txBody>
-          <a:bodyPr/>
-          <a:lstStyle/>
-          <a:p>
-            <a:fld id="{55670E94-029C-4BA8-8D44-FBB339E4924F}" type="slidenum">
-              <a:rPr lang="en-AU" smtClean="0">
-                <a:solidFill>
-                  <a:prstClr val="black">
-                    <a:tint val="75000"/>
-                  </a:prstClr>
-                </a:solidFill>
-              </a:rPr>
-              <a:pPr/>
-              <a:t>32</a:t>
-            </a:fld>
-            <a:endParaRPr lang="en-AU" dirty="0">
-              <a:solidFill>
-                <a:prstClr val="black">
-                  <a:tint val="75000"/>
-                </a:prstClr>
-              </a:solidFill>
-            </a:endParaRPr>
-          </a:p>
-        </p:txBody>
-      </p:sp>
-      <p:sp>
-        <p:nvSpPr>
-          <p:cNvPr id="7" name="Title 3">
-            <a:extLst>
-              <a:ext uri="{FF2B5EF4-FFF2-40B4-BE49-F238E27FC236}">
-                <a16:creationId xmlns:a16="http://schemas.microsoft.com/office/drawing/2014/main" id="{7AF2CD78-8763-4C94-B120-CC8C0B08A844}"/>
-              </a:ext>
-            </a:extLst>
-          </p:cNvPr>
-          <p:cNvSpPr>
-            <a:spLocks noGrp="1"/>
-          </p:cNvSpPr>
-          <p:nvPr>
-            <p:ph type="title"/>
-          </p:nvPr>
-        </p:nvSpPr>
-        <p:spPr>
-          <a:xfrm>
-            <a:off x="1561495" y="0"/>
-            <a:ext cx="8725505" cy="1257300"/>
-          </a:xfrm>
-        </p:spPr>
-        <p:txBody>
-          <a:bodyPr/>
-          <a:lstStyle/>
-          <a:p>
-            <a:r>
-              <a:rPr lang="en-AU" dirty="0"/>
-              <a:t>Week 2’s Lecture</a:t>
-            </a:r>
-          </a:p>
-        </p:txBody>
-      </p:sp>
-      <p:sp>
-        <p:nvSpPr>
-          <p:cNvPr id="8" name="Title 1">
-            <a:extLst>
-              <a:ext uri="{FF2B5EF4-FFF2-40B4-BE49-F238E27FC236}">
-                <a16:creationId xmlns:a16="http://schemas.microsoft.com/office/drawing/2014/main" id="{FA342611-CC4D-48BC-8267-630381452B50}"/>
-              </a:ext>
-            </a:extLst>
-          </p:cNvPr>
-          <p:cNvSpPr txBox="1">
-            <a:spLocks/>
-          </p:cNvSpPr>
-          <p:nvPr/>
-        </p:nvSpPr>
-        <p:spPr>
-          <a:xfrm>
-            <a:off x="-262886" y="1011135"/>
-            <a:ext cx="3351049" cy="984250"/>
-          </a:xfrm>
-          <a:prstGeom prst="rect">
-            <a:avLst/>
-          </a:prstGeom>
-          <a:effectLst>
-            <a:outerShdw blurRad="25400" dir="17880000">
-              <a:srgbClr val="000000">
-                <a:alpha val="46000"/>
-              </a:srgbClr>
-            </a:outerShdw>
-          </a:effectLst>
-        </p:spPr>
-        <p:txBody>
-          <a:bodyPr vert="horz" lIns="91440" tIns="45720" rIns="91440" bIns="45720" rtlCol="0" anchor="ctr">
-            <a:normAutofit/>
-          </a:bodyPr>
-          <a:lstStyle>
-            <a:lvl1pPr algn="ctr" defTabSz="457200" rtl="0" eaLnBrk="1" latinLnBrk="0" hangingPunct="1">
-              <a:lnSpc>
-                <a:spcPct val="90000"/>
-              </a:lnSpc>
-              <a:spcBef>
-                <a:spcPct val="0"/>
-              </a:spcBef>
-              <a:buNone/>
-              <a:defRPr sz="4000" b="1" kern="1200">
-                <a:ln>
-                  <a:solidFill>
-                    <a:schemeClr val="bg1">
-                      <a:lumMod val="75000"/>
-                      <a:lumOff val="25000"/>
-                      <a:alpha val="10000"/>
-                    </a:schemeClr>
-                  </a:solidFill>
-                </a:ln>
-                <a:solidFill>
-                  <a:schemeClr val="tx2"/>
-                </a:solidFill>
-                <a:effectLst>
-                  <a:outerShdw blurRad="9525" dist="25400" dir="14640000" algn="tl" rotWithShape="0">
-                    <a:schemeClr val="bg1">
-                      <a:alpha val="30000"/>
-                    </a:schemeClr>
-                  </a:outerShdw>
-                </a:effectLst>
-                <a:latin typeface="+mj-lt"/>
-                <a:ea typeface="+mj-ea"/>
-                <a:cs typeface="Trebuchet MS"/>
-              </a:defRPr>
-            </a:lvl1pPr>
-            <a:lvl2pPr eaLnBrk="1" hangingPunct="1">
-              <a:defRPr>
-                <a:solidFill>
-                  <a:schemeClr val="tx2"/>
-                </a:solidFill>
-              </a:defRPr>
-            </a:lvl2pPr>
-            <a:lvl3pPr eaLnBrk="1" hangingPunct="1">
-              <a:defRPr>
-                <a:solidFill>
-                  <a:schemeClr val="tx2"/>
-                </a:solidFill>
-              </a:defRPr>
-            </a:lvl3pPr>
-            <a:lvl4pPr eaLnBrk="1" hangingPunct="1">
-              <a:defRPr>
-                <a:solidFill>
-                  <a:schemeClr val="tx2"/>
-                </a:solidFill>
-              </a:defRPr>
-            </a:lvl4pPr>
-            <a:lvl5pPr eaLnBrk="1" hangingPunct="1">
-              <a:defRPr>
-                <a:solidFill>
-                  <a:schemeClr val="tx2"/>
-                </a:solidFill>
-              </a:defRPr>
-            </a:lvl5pPr>
-            <a:lvl6pPr eaLnBrk="1" hangingPunct="1">
-              <a:defRPr>
-                <a:solidFill>
-                  <a:schemeClr val="tx2"/>
-                </a:solidFill>
-              </a:defRPr>
-            </a:lvl6pPr>
-            <a:lvl7pPr eaLnBrk="1" hangingPunct="1">
-              <a:defRPr>
-                <a:solidFill>
-                  <a:schemeClr val="tx2"/>
-                </a:solidFill>
-              </a:defRPr>
-            </a:lvl7pPr>
-            <a:lvl8pPr eaLnBrk="1" hangingPunct="1">
-              <a:defRPr>
-                <a:solidFill>
-                  <a:schemeClr val="tx2"/>
-                </a:solidFill>
-              </a:defRPr>
-            </a:lvl8pPr>
-            <a:lvl9pPr eaLnBrk="1" hangingPunct="1">
-              <a:defRPr>
-                <a:solidFill>
-                  <a:schemeClr val="tx2"/>
-                </a:solidFill>
-              </a:defRPr>
-            </a:lvl9pPr>
-          </a:lstStyle>
-          <a:p>
-            <a:r>
-              <a:rPr lang="en-AU" sz="2800" dirty="0"/>
-              <a:t>Key space</a:t>
-            </a:r>
-          </a:p>
-        </p:txBody>
-      </p:sp>
-      <p:sp>
-        <p:nvSpPr>
-          <p:cNvPr id="9" name="Content Placeholder 2">
-            <a:extLst>
-              <a:ext uri="{FF2B5EF4-FFF2-40B4-BE49-F238E27FC236}">
-                <a16:creationId xmlns:a16="http://schemas.microsoft.com/office/drawing/2014/main" id="{D059904D-22DD-4D9F-B34E-E9301BB93058}"/>
-              </a:ext>
-            </a:extLst>
-          </p:cNvPr>
-          <p:cNvSpPr>
-            <a:spLocks noGrp="1"/>
-          </p:cNvSpPr>
-          <p:nvPr>
-            <p:ph idx="1"/>
-          </p:nvPr>
-        </p:nvSpPr>
-        <p:spPr>
-          <a:xfrm>
-            <a:off x="690527" y="2211426"/>
-            <a:ext cx="10353762" cy="984250"/>
-          </a:xfrm>
-        </p:spPr>
-        <p:txBody>
-          <a:bodyPr>
-            <a:normAutofit/>
-          </a:bodyPr>
-          <a:lstStyle/>
-          <a:p>
-            <a:r>
-              <a:rPr lang="en-AU" sz="2800" dirty="0"/>
-              <a:t>Polyalphabetic cipher: 26</a:t>
-            </a:r>
-            <a:r>
-              <a:rPr lang="en-US" sz="2800" dirty="0"/>
-              <a:t>^n</a:t>
-            </a:r>
-            <a:endParaRPr lang="en-AU" sz="2800" dirty="0"/>
-          </a:p>
-        </p:txBody>
-      </p:sp>
-      <p:sp>
-        <p:nvSpPr>
-          <p:cNvPr id="6" name="Content Placeholder 2">
-            <a:extLst>
-              <a:ext uri="{FF2B5EF4-FFF2-40B4-BE49-F238E27FC236}">
-                <a16:creationId xmlns:a16="http://schemas.microsoft.com/office/drawing/2014/main" id="{4307E726-BF42-400E-9066-C44412BBE07F}"/>
-              </a:ext>
-            </a:extLst>
-          </p:cNvPr>
-          <p:cNvSpPr txBox="1">
-            <a:spLocks/>
-          </p:cNvSpPr>
-          <p:nvPr/>
-        </p:nvSpPr>
-        <p:spPr>
-          <a:xfrm>
-            <a:off x="690527" y="3013817"/>
-            <a:ext cx="10353762" cy="984250"/>
-          </a:xfrm>
-          <a:prstGeom prst="rect">
-            <a:avLst/>
-          </a:prstGeom>
-          <a:effectLst>
-            <a:outerShdw blurRad="25400" dir="17880000">
-              <a:srgbClr val="000000">
-                <a:alpha val="46000"/>
-              </a:srgbClr>
-            </a:outerShdw>
-          </a:effectLst>
-        </p:spPr>
-        <p:txBody>
-          <a:bodyPr vert="horz" lIns="91440" tIns="45720" rIns="91440" bIns="45720" rtlCol="0" anchor="t">
-            <a:normAutofit/>
-          </a:bodyPr>
-          <a:lstStyle>
-            <a:lvl1pPr marL="342900" indent="-306000" algn="l" defTabSz="457200" rtl="0" eaLnBrk="1" latinLnBrk="0" hangingPunct="1">
-              <a:lnSpc>
-                <a:spcPct val="110000"/>
-              </a:lnSpc>
-              <a:spcBef>
-                <a:spcPct val="20000"/>
-              </a:spcBef>
-              <a:spcAft>
-                <a:spcPts val="600"/>
-              </a:spcAft>
-              <a:buClr>
-                <a:schemeClr val="tx2"/>
-              </a:buClr>
-              <a:buSzPct val="70000"/>
-              <a:buFont typeface="Wingdings 2" charset="2"/>
-              <a:buChar char=""/>
-              <a:defRPr sz="2100" b="1" kern="1200">
-                <a:ln>
-                  <a:solidFill>
-                    <a:schemeClr val="bg1">
-                      <a:lumMod val="75000"/>
-                      <a:lumOff val="25000"/>
-                      <a:alpha val="10000"/>
-                    </a:schemeClr>
-                  </a:solidFill>
-                </a:ln>
-                <a:solidFill>
-                  <a:schemeClr val="tx2"/>
-                </a:solidFill>
-                <a:effectLst>
-                  <a:outerShdw blurRad="9525" dist="25400" dir="14640000" algn="tl" rotWithShape="0">
-                    <a:schemeClr val="bg1">
-                      <a:alpha val="30000"/>
-                    </a:schemeClr>
-                  </a:outerShdw>
-                </a:effectLst>
-                <a:latin typeface="+mn-lt"/>
-                <a:ea typeface="+mn-ea"/>
-                <a:cs typeface="+mn-cs"/>
-              </a:defRPr>
-            </a:lvl1pPr>
-            <a:lvl2pPr marL="720000" indent="-270000" algn="l" defTabSz="457200" rtl="0" eaLnBrk="1" latinLnBrk="0" hangingPunct="1">
-              <a:spcBef>
-                <a:spcPct val="20000"/>
-              </a:spcBef>
-              <a:spcAft>
-                <a:spcPts val="600"/>
-              </a:spcAft>
-              <a:buClr>
-                <a:schemeClr val="tx2"/>
-              </a:buClr>
-              <a:buSzPct val="70000"/>
-              <a:buFont typeface="Wingdings 2" charset="2"/>
-              <a:buChar char=""/>
-              <a:defRPr sz="1900" b="1" kern="1200">
-                <a:ln>
-                  <a:solidFill>
-                    <a:schemeClr val="bg1">
-                      <a:lumMod val="75000"/>
-                      <a:lumOff val="25000"/>
-                      <a:alpha val="10000"/>
-                    </a:schemeClr>
-                  </a:solidFill>
-                </a:ln>
-                <a:solidFill>
-                  <a:schemeClr val="tx2"/>
-                </a:solidFill>
-                <a:effectLst>
-                  <a:outerShdw blurRad="9525" dist="25400" dir="14640000" algn="tl" rotWithShape="0">
-                    <a:schemeClr val="bg1">
-                      <a:alpha val="30000"/>
-                    </a:schemeClr>
-                  </a:outerShdw>
-                </a:effectLst>
-                <a:latin typeface="+mn-lt"/>
-                <a:ea typeface="+mn-ea"/>
-                <a:cs typeface="+mn-cs"/>
-              </a:defRPr>
-            </a:lvl2pPr>
-            <a:lvl3pPr marL="1026000" indent="-216000" algn="l" defTabSz="457200" rtl="0" eaLnBrk="1" latinLnBrk="0" hangingPunct="1">
-              <a:spcBef>
-                <a:spcPct val="20000"/>
-              </a:spcBef>
-              <a:spcAft>
-                <a:spcPts val="600"/>
-              </a:spcAft>
-              <a:buClr>
-                <a:schemeClr val="tx2"/>
-              </a:buClr>
-              <a:buSzPct val="70000"/>
-              <a:buFont typeface="Wingdings 2" charset="2"/>
-              <a:buChar char=""/>
-              <a:defRPr sz="1700" b="1" kern="1200">
-                <a:ln>
-                  <a:solidFill>
-                    <a:schemeClr val="bg1">
-                      <a:lumMod val="75000"/>
-                      <a:lumOff val="25000"/>
-                      <a:alpha val="10000"/>
-                    </a:schemeClr>
-                  </a:solidFill>
-                </a:ln>
-                <a:solidFill>
-                  <a:schemeClr val="tx2"/>
-                </a:solidFill>
-                <a:effectLst>
-                  <a:outerShdw blurRad="9525" dist="25400" dir="14640000" algn="tl" rotWithShape="0">
-                    <a:schemeClr val="bg1">
-                      <a:alpha val="30000"/>
-                    </a:schemeClr>
-                  </a:outerShdw>
-                </a:effectLst>
-                <a:latin typeface="+mn-lt"/>
-                <a:ea typeface="+mn-ea"/>
-                <a:cs typeface="+mn-cs"/>
-              </a:defRPr>
-            </a:lvl3pPr>
-            <a:lvl4pPr marL="1386000" indent="-216000" algn="l" defTabSz="457200" rtl="0" eaLnBrk="1" latinLnBrk="0" hangingPunct="1">
-              <a:spcBef>
-                <a:spcPct val="20000"/>
-              </a:spcBef>
-              <a:spcAft>
-                <a:spcPts val="600"/>
-              </a:spcAft>
-              <a:buClr>
-                <a:schemeClr val="tx2"/>
-              </a:buClr>
-              <a:buSzPct val="70000"/>
-              <a:buFont typeface="Wingdings 2" charset="2"/>
-              <a:buChar char=""/>
-              <a:defRPr sz="1500" b="1" kern="1200">
-                <a:ln>
-                  <a:solidFill>
-                    <a:schemeClr val="bg1">
-                      <a:lumMod val="75000"/>
-                      <a:lumOff val="25000"/>
-                      <a:alpha val="10000"/>
-                    </a:schemeClr>
-                  </a:solidFill>
-                </a:ln>
-                <a:solidFill>
-                  <a:schemeClr val="tx2"/>
-                </a:solidFill>
-                <a:effectLst>
-                  <a:outerShdw blurRad="9525" dist="25400" dir="14640000" algn="tl" rotWithShape="0">
-                    <a:schemeClr val="bg1">
-                      <a:alpha val="30000"/>
-                    </a:schemeClr>
-                  </a:outerShdw>
-                </a:effectLst>
-                <a:latin typeface="+mn-lt"/>
-                <a:ea typeface="+mn-ea"/>
-                <a:cs typeface="+mn-cs"/>
-              </a:defRPr>
-            </a:lvl4pPr>
-            <a:lvl5pPr marL="1674000" indent="-216000" algn="l" defTabSz="457200" rtl="0" eaLnBrk="1" latinLnBrk="0" hangingPunct="1">
-              <a:spcBef>
-                <a:spcPct val="20000"/>
-              </a:spcBef>
-              <a:spcAft>
-                <a:spcPts val="600"/>
-              </a:spcAft>
-              <a:buClr>
-                <a:schemeClr val="tx2"/>
-              </a:buClr>
-              <a:buSzPct val="70000"/>
-              <a:buFont typeface="Wingdings 2" charset="2"/>
-              <a:buChar char=""/>
-              <a:defRPr sz="1500" b="1" kern="1200">
-                <a:ln>
-                  <a:solidFill>
-                    <a:schemeClr val="bg1">
-                      <a:lumMod val="75000"/>
-                      <a:lumOff val="25000"/>
-                      <a:alpha val="10000"/>
-                    </a:schemeClr>
-                  </a:solidFill>
-                </a:ln>
-                <a:solidFill>
-                  <a:schemeClr val="tx2"/>
-                </a:solidFill>
-                <a:effectLst>
-                  <a:outerShdw blurRad="9525" dist="25400" dir="14640000" algn="tl" rotWithShape="0">
-                    <a:schemeClr val="bg1">
-                      <a:alpha val="30000"/>
-                    </a:schemeClr>
-                  </a:outerShdw>
-                </a:effectLst>
-                <a:latin typeface="+mn-lt"/>
-                <a:ea typeface="+mn-ea"/>
-                <a:cs typeface="+mn-cs"/>
-              </a:defRPr>
-            </a:lvl5pPr>
-            <a:lvl6pPr marL="2014600" indent="-228600" algn="l" defTabSz="457200" rtl="0" eaLnBrk="1" latinLnBrk="0" hangingPunct="1">
-              <a:spcBef>
-                <a:spcPct val="20000"/>
-              </a:spcBef>
-              <a:spcAft>
-                <a:spcPts val="600"/>
-              </a:spcAft>
-              <a:buClr>
-                <a:schemeClr val="tx2"/>
-              </a:buClr>
-              <a:buSzPct val="70000"/>
-              <a:buFont typeface="Wingdings 2" charset="2"/>
-              <a:buChar char=""/>
-              <a:defRPr sz="1400" kern="1200">
-                <a:ln>
-                  <a:solidFill>
-                    <a:schemeClr val="bg1">
-                      <a:lumMod val="75000"/>
-                      <a:lumOff val="25000"/>
-                      <a:alpha val="10000"/>
-                    </a:schemeClr>
-                  </a:solidFill>
-                </a:ln>
-                <a:solidFill>
-                  <a:schemeClr val="tx2"/>
-                </a:solidFill>
-                <a:effectLst>
-                  <a:outerShdw blurRad="9525" dist="25400" dir="14640000" algn="tl" rotWithShape="0">
-                    <a:schemeClr val="bg1">
-                      <a:alpha val="30000"/>
-                    </a:schemeClr>
-                  </a:outerShdw>
-                </a:effectLst>
-                <a:latin typeface="+mn-lt"/>
-                <a:ea typeface="+mn-ea"/>
-                <a:cs typeface="+mn-cs"/>
-              </a:defRPr>
-            </a:lvl6pPr>
-            <a:lvl7pPr marL="2401800" indent="-228600" algn="l" defTabSz="457200" rtl="0" eaLnBrk="1" latinLnBrk="0" hangingPunct="1">
-              <a:spcBef>
-                <a:spcPct val="20000"/>
-              </a:spcBef>
-              <a:spcAft>
-                <a:spcPts val="600"/>
-              </a:spcAft>
-              <a:buClr>
-                <a:schemeClr val="tx2"/>
-              </a:buClr>
-              <a:buSzPct val="70000"/>
-              <a:buFont typeface="Wingdings 2" charset="2"/>
-              <a:buChar char=""/>
-              <a:defRPr sz="1400" kern="1200">
-                <a:ln>
-                  <a:solidFill>
-                    <a:schemeClr val="bg1">
-                      <a:lumMod val="75000"/>
-                      <a:lumOff val="25000"/>
-                      <a:alpha val="10000"/>
-                    </a:schemeClr>
-                  </a:solidFill>
-                </a:ln>
-                <a:solidFill>
-                  <a:schemeClr val="tx2"/>
-                </a:solidFill>
-                <a:effectLst>
-                  <a:outerShdw blurRad="9525" dist="25400" dir="14640000" algn="tl" rotWithShape="0">
-                    <a:schemeClr val="bg1">
-                      <a:alpha val="30000"/>
-                    </a:schemeClr>
-                  </a:outerShdw>
-                </a:effectLst>
-                <a:latin typeface="+mn-lt"/>
-                <a:ea typeface="+mn-ea"/>
-                <a:cs typeface="+mn-cs"/>
-              </a:defRPr>
-            </a:lvl7pPr>
-            <a:lvl8pPr marL="2789000" indent="-228600" algn="l" defTabSz="457200" rtl="0" eaLnBrk="1" latinLnBrk="0" hangingPunct="1">
-              <a:spcBef>
-                <a:spcPct val="20000"/>
-              </a:spcBef>
-              <a:spcAft>
-                <a:spcPts val="600"/>
-              </a:spcAft>
-              <a:buClr>
-                <a:schemeClr val="tx2"/>
-              </a:buClr>
-              <a:buSzPct val="70000"/>
-              <a:buFont typeface="Wingdings 2" charset="2"/>
-              <a:buChar char=""/>
-              <a:defRPr sz="1400" kern="1200">
-                <a:ln>
-                  <a:solidFill>
-                    <a:schemeClr val="bg1">
-                      <a:lumMod val="75000"/>
-                      <a:lumOff val="25000"/>
-                      <a:alpha val="10000"/>
-                    </a:schemeClr>
-                  </a:solidFill>
-                </a:ln>
-                <a:solidFill>
-                  <a:schemeClr val="tx2"/>
-                </a:solidFill>
-                <a:effectLst>
-                  <a:outerShdw blurRad="9525" dist="25400" dir="14640000" algn="tl" rotWithShape="0">
-                    <a:schemeClr val="bg1">
-                      <a:alpha val="30000"/>
-                    </a:schemeClr>
-                  </a:outerShdw>
-                </a:effectLst>
-                <a:latin typeface="+mn-lt"/>
-                <a:ea typeface="+mn-ea"/>
-                <a:cs typeface="+mn-cs"/>
-              </a:defRPr>
-            </a:lvl8pPr>
-            <a:lvl9pPr marL="3106200" indent="-228600" algn="l" defTabSz="457200" rtl="0" eaLnBrk="1" latinLnBrk="0" hangingPunct="1">
-              <a:spcBef>
-                <a:spcPct val="20000"/>
-              </a:spcBef>
-              <a:spcAft>
-                <a:spcPts val="600"/>
-              </a:spcAft>
-              <a:buClr>
-                <a:schemeClr val="tx2"/>
-              </a:buClr>
-              <a:buSzPct val="70000"/>
-              <a:buFont typeface="Wingdings 2" charset="2"/>
-              <a:buChar char=""/>
-              <a:defRPr sz="1400" kern="1200">
-                <a:ln>
-                  <a:solidFill>
-                    <a:schemeClr val="bg1">
-                      <a:lumMod val="75000"/>
-                      <a:lumOff val="25000"/>
-                      <a:alpha val="10000"/>
-                    </a:schemeClr>
-                  </a:solidFill>
-                </a:ln>
-                <a:solidFill>
-                  <a:schemeClr val="tx2"/>
-                </a:solidFill>
-                <a:effectLst>
-                  <a:outerShdw blurRad="9525" dist="25400" dir="14640000" algn="tl" rotWithShape="0">
-                    <a:schemeClr val="bg1">
-                      <a:alpha val="30000"/>
-                    </a:schemeClr>
-                  </a:outerShdw>
-                </a:effectLst>
-                <a:latin typeface="+mn-lt"/>
-                <a:ea typeface="+mn-ea"/>
-                <a:cs typeface="+mn-cs"/>
-              </a:defRPr>
-            </a:lvl9pPr>
-          </a:lstStyle>
-          <a:p>
-            <a:r>
-              <a:rPr lang="en-AU" sz="2800" dirty="0"/>
-              <a:t>Monoalphabetic cipher: 26</a:t>
-            </a:r>
-            <a:r>
-              <a:rPr lang="en-US" sz="2800" dirty="0"/>
-              <a:t>!</a:t>
-            </a:r>
-            <a:endParaRPr lang="en-AU" sz="2800" dirty="0"/>
-          </a:p>
-        </p:txBody>
-      </p:sp>
-    </p:spTree>
-    <p:extLst>
-      <p:ext uri="{BB962C8B-B14F-4D97-AF65-F5344CB8AC3E}">
-        <p14:creationId xmlns:p14="http://schemas.microsoft.com/office/powerpoint/2010/main" val="1519529533"/>
-      </p:ext>
-    </p:extLst>
-  </p:cSld>
-  <p:clrMapOvr>
-    <a:masterClrMapping/>
-  </p:clrMapOvr>
-</p:sld>
-</file>
-
-<file path=ppt/slides/slide33.xml><?xml version="1.0" encoding="utf-8"?>
-<p:sld xmlns:a="http://schemas.openxmlformats.org/drawingml/2006/main" xmlns:r="http://schemas.openxmlformats.org/officeDocument/2006/relationships" xmlns:p="http://schemas.openxmlformats.org/presentationml/2006/main">
-  <p:cSld>
-    <p:spTree>
-      <p:nvGrpSpPr>
-        <p:cNvPr id="1" name=""/>
-        <p:cNvGrpSpPr/>
-        <p:nvPr/>
-      </p:nvGrpSpPr>
-      <p:grpSpPr>
-        <a:xfrm>
-          <a:off x="0" y="0"/>
-          <a:ext cx="0" cy="0"/>
-          <a:chOff x="0" y="0"/>
-          <a:chExt cx="0" cy="0"/>
-        </a:xfrm>
-      </p:grpSpPr>
-      <p:sp>
-        <p:nvSpPr>
-          <p:cNvPr id="2" name="Title 1">
-            <a:extLst>
-              <a:ext uri="{FF2B5EF4-FFF2-40B4-BE49-F238E27FC236}">
-                <a16:creationId xmlns:a16="http://schemas.microsoft.com/office/drawing/2014/main" id="{093AB4B3-2123-4AB2-AB02-A3E645B41BE0}"/>
-              </a:ext>
-            </a:extLst>
-          </p:cNvPr>
-          <p:cNvSpPr>
-            <a:spLocks noGrp="1"/>
-          </p:cNvSpPr>
-          <p:nvPr>
-            <p:ph type="title"/>
-          </p:nvPr>
-        </p:nvSpPr>
-        <p:spPr>
-          <a:xfrm>
-            <a:off x="913795" y="146050"/>
-            <a:ext cx="10353762" cy="1257300"/>
-          </a:xfrm>
-        </p:spPr>
-        <p:txBody>
-          <a:bodyPr/>
-          <a:lstStyle/>
-          <a:p>
-            <a:r>
-              <a:rPr lang="en-AU" dirty="0"/>
-              <a:t>Key space</a:t>
-            </a:r>
-          </a:p>
-        </p:txBody>
-      </p:sp>
-      <p:sp>
-        <p:nvSpPr>
-          <p:cNvPr id="3" name="Content Placeholder 2">
-            <a:extLst>
-              <a:ext uri="{FF2B5EF4-FFF2-40B4-BE49-F238E27FC236}">
-                <a16:creationId xmlns:a16="http://schemas.microsoft.com/office/drawing/2014/main" id="{A39D72D1-256A-4B1B-9CB0-BCD3A203872C}"/>
-              </a:ext>
-            </a:extLst>
-          </p:cNvPr>
-          <p:cNvSpPr>
-            <a:spLocks noGrp="1"/>
-          </p:cNvSpPr>
-          <p:nvPr>
-            <p:ph idx="1"/>
-          </p:nvPr>
-        </p:nvSpPr>
-        <p:spPr>
-          <a:xfrm>
-            <a:off x="831438" y="1403202"/>
-            <a:ext cx="8759129" cy="984250"/>
-          </a:xfrm>
-        </p:spPr>
-        <p:txBody>
-          <a:bodyPr>
-            <a:normAutofit/>
-          </a:bodyPr>
-          <a:lstStyle/>
-          <a:p>
-            <a:r>
-              <a:rPr lang="en-AU" sz="2800" dirty="0"/>
-              <a:t>Polyalphabetic cipher: multiple alphabet for substitution</a:t>
-            </a:r>
-          </a:p>
-        </p:txBody>
-      </p:sp>
-      <p:sp>
-        <p:nvSpPr>
-          <p:cNvPr id="7" name="Content Placeholder 2">
-            <a:extLst>
-              <a:ext uri="{FF2B5EF4-FFF2-40B4-BE49-F238E27FC236}">
-                <a16:creationId xmlns:a16="http://schemas.microsoft.com/office/drawing/2014/main" id="{AAEDE18B-16ED-4051-8375-05743210B841}"/>
-              </a:ext>
-            </a:extLst>
-          </p:cNvPr>
-          <p:cNvSpPr txBox="1">
-            <a:spLocks/>
-          </p:cNvSpPr>
-          <p:nvPr/>
-        </p:nvSpPr>
-        <p:spPr>
-          <a:xfrm>
-            <a:off x="913794" y="2025354"/>
-            <a:ext cx="10353761" cy="3067346"/>
-          </a:xfrm>
-          <a:prstGeom prst="rect">
-            <a:avLst/>
-          </a:prstGeom>
-          <a:effectLst>
-            <a:outerShdw blurRad="25400" dir="17880000">
-              <a:srgbClr val="000000">
-                <a:alpha val="46000"/>
-              </a:srgbClr>
-            </a:outerShdw>
-          </a:effectLst>
-        </p:spPr>
-        <p:txBody>
-          <a:bodyPr vert="horz" lIns="91440" tIns="45720" rIns="91440" bIns="45720" rtlCol="0" anchor="ctr">
-            <a:normAutofit/>
-          </a:bodyPr>
-          <a:lstStyle>
-            <a:lvl1pPr marL="342900" indent="-306000" algn="l" defTabSz="457200" rtl="0" eaLnBrk="1" latinLnBrk="0" hangingPunct="1">
-              <a:lnSpc>
-                <a:spcPct val="110000"/>
-              </a:lnSpc>
-              <a:spcBef>
-                <a:spcPct val="20000"/>
-              </a:spcBef>
-              <a:spcAft>
-                <a:spcPts val="600"/>
-              </a:spcAft>
-              <a:buClr>
-                <a:schemeClr val="tx2"/>
-              </a:buClr>
-              <a:buSzPct val="70000"/>
-              <a:buFont typeface="Wingdings 2" charset="2"/>
-              <a:buChar char=""/>
-              <a:defRPr sz="2100" kern="1200">
-                <a:ln>
-                  <a:solidFill>
-                    <a:schemeClr val="bg1">
-                      <a:lumMod val="75000"/>
-                      <a:lumOff val="25000"/>
-                      <a:alpha val="10000"/>
-                    </a:schemeClr>
-                  </a:solidFill>
-                </a:ln>
-                <a:solidFill>
-                  <a:schemeClr val="tx2"/>
-                </a:solidFill>
-                <a:effectLst>
-                  <a:outerShdw blurRad="9525" dist="25400" dir="14640000" algn="tl" rotWithShape="0">
-                    <a:schemeClr val="bg1">
-                      <a:alpha val="30000"/>
-                    </a:schemeClr>
-                  </a:outerShdw>
-                </a:effectLst>
-                <a:latin typeface="+mn-lt"/>
-                <a:ea typeface="+mn-ea"/>
-                <a:cs typeface="+mn-cs"/>
-              </a:defRPr>
-            </a:lvl1pPr>
-            <a:lvl2pPr marL="720000" indent="-270000" algn="l" defTabSz="457200" rtl="0" eaLnBrk="1" latinLnBrk="0" hangingPunct="1">
-              <a:spcBef>
-                <a:spcPct val="20000"/>
-              </a:spcBef>
-              <a:spcAft>
-                <a:spcPts val="600"/>
-              </a:spcAft>
-              <a:buClr>
-                <a:schemeClr val="tx2"/>
-              </a:buClr>
-              <a:buSzPct val="70000"/>
-              <a:buFont typeface="Wingdings 2" charset="2"/>
-              <a:buChar char=""/>
-              <a:defRPr sz="1900" kern="1200">
-                <a:ln>
-                  <a:solidFill>
-                    <a:schemeClr val="bg1">
-                      <a:lumMod val="75000"/>
-                      <a:lumOff val="25000"/>
-                      <a:alpha val="10000"/>
-                    </a:schemeClr>
-                  </a:solidFill>
-                </a:ln>
-                <a:solidFill>
-                  <a:schemeClr val="tx2"/>
-                </a:solidFill>
-                <a:effectLst>
-                  <a:outerShdw blurRad="9525" dist="25400" dir="14640000" algn="tl" rotWithShape="0">
-                    <a:schemeClr val="bg1">
-                      <a:alpha val="30000"/>
-                    </a:schemeClr>
-                  </a:outerShdw>
-                </a:effectLst>
-                <a:latin typeface="+mn-lt"/>
-                <a:ea typeface="+mn-ea"/>
-                <a:cs typeface="+mn-cs"/>
-              </a:defRPr>
-            </a:lvl2pPr>
-            <a:lvl3pPr marL="1026000" indent="-216000" algn="l" defTabSz="457200" rtl="0" eaLnBrk="1" latinLnBrk="0" hangingPunct="1">
-              <a:spcBef>
-                <a:spcPct val="20000"/>
-              </a:spcBef>
-              <a:spcAft>
-                <a:spcPts val="600"/>
-              </a:spcAft>
-              <a:buClr>
-                <a:schemeClr val="tx2"/>
-              </a:buClr>
-              <a:buSzPct val="70000"/>
-              <a:buFont typeface="Wingdings 2" charset="2"/>
-              <a:buChar char=""/>
-              <a:defRPr sz="1700" kern="1200">
-                <a:ln>
-                  <a:solidFill>
-                    <a:schemeClr val="bg1">
-                      <a:lumMod val="75000"/>
-                      <a:lumOff val="25000"/>
-                      <a:alpha val="10000"/>
-                    </a:schemeClr>
-                  </a:solidFill>
-                </a:ln>
-                <a:solidFill>
-                  <a:schemeClr val="tx2"/>
-                </a:solidFill>
-                <a:effectLst>
-                  <a:outerShdw blurRad="9525" dist="25400" dir="14640000" algn="tl" rotWithShape="0">
-                    <a:schemeClr val="bg1">
-                      <a:alpha val="30000"/>
-                    </a:schemeClr>
-                  </a:outerShdw>
-                </a:effectLst>
-                <a:latin typeface="+mn-lt"/>
-                <a:ea typeface="+mn-ea"/>
-                <a:cs typeface="+mn-cs"/>
-              </a:defRPr>
-            </a:lvl3pPr>
-            <a:lvl4pPr marL="1386000" indent="-216000" algn="l" defTabSz="457200" rtl="0" eaLnBrk="1" latinLnBrk="0" hangingPunct="1">
-              <a:spcBef>
-                <a:spcPct val="20000"/>
-              </a:spcBef>
-              <a:spcAft>
-                <a:spcPts val="600"/>
-              </a:spcAft>
-              <a:buClr>
-                <a:schemeClr val="tx2"/>
-              </a:buClr>
-              <a:buSzPct val="70000"/>
-              <a:buFont typeface="Wingdings 2" charset="2"/>
-              <a:buChar char=""/>
-              <a:defRPr sz="1500" kern="1200">
-                <a:ln>
-                  <a:solidFill>
-                    <a:schemeClr val="bg1">
-                      <a:lumMod val="75000"/>
-                      <a:lumOff val="25000"/>
-                      <a:alpha val="10000"/>
-                    </a:schemeClr>
-                  </a:solidFill>
-                </a:ln>
-                <a:solidFill>
-                  <a:schemeClr val="tx2"/>
-                </a:solidFill>
-                <a:effectLst>
-                  <a:outerShdw blurRad="9525" dist="25400" dir="14640000" algn="tl" rotWithShape="0">
-                    <a:schemeClr val="bg1">
-                      <a:alpha val="30000"/>
-                    </a:schemeClr>
-                  </a:outerShdw>
-                </a:effectLst>
-                <a:latin typeface="+mn-lt"/>
-                <a:ea typeface="+mn-ea"/>
-                <a:cs typeface="+mn-cs"/>
-              </a:defRPr>
-            </a:lvl4pPr>
-            <a:lvl5pPr marL="1674000" indent="-216000" algn="l" defTabSz="457200" rtl="0" eaLnBrk="1" latinLnBrk="0" hangingPunct="1">
-              <a:spcBef>
-                <a:spcPct val="20000"/>
-              </a:spcBef>
-              <a:spcAft>
-                <a:spcPts val="600"/>
-              </a:spcAft>
-              <a:buClr>
-                <a:schemeClr val="tx2"/>
-              </a:buClr>
-              <a:buSzPct val="70000"/>
-              <a:buFont typeface="Wingdings 2" charset="2"/>
-              <a:buChar char=""/>
-              <a:defRPr sz="1500" kern="1200">
-                <a:ln>
-                  <a:solidFill>
-                    <a:schemeClr val="bg1">
-                      <a:lumMod val="75000"/>
-                      <a:lumOff val="25000"/>
-                      <a:alpha val="10000"/>
-                    </a:schemeClr>
-                  </a:solidFill>
-                </a:ln>
-                <a:solidFill>
-                  <a:schemeClr val="tx2"/>
-                </a:solidFill>
-                <a:effectLst>
-                  <a:outerShdw blurRad="9525" dist="25400" dir="14640000" algn="tl" rotWithShape="0">
-                    <a:schemeClr val="bg1">
-                      <a:alpha val="30000"/>
-                    </a:schemeClr>
-                  </a:outerShdw>
-                </a:effectLst>
-                <a:latin typeface="+mn-lt"/>
-                <a:ea typeface="+mn-ea"/>
-                <a:cs typeface="+mn-cs"/>
-              </a:defRPr>
-            </a:lvl5pPr>
-            <a:lvl6pPr marL="2014600" indent="-228600" algn="l" defTabSz="457200" rtl="0" eaLnBrk="1" latinLnBrk="0" hangingPunct="1">
-              <a:spcBef>
-                <a:spcPct val="20000"/>
-              </a:spcBef>
-              <a:spcAft>
-                <a:spcPts val="600"/>
-              </a:spcAft>
-              <a:buClr>
-                <a:schemeClr val="tx2"/>
-              </a:buClr>
-              <a:buSzPct val="70000"/>
-              <a:buFont typeface="Wingdings 2" charset="2"/>
-              <a:buChar char=""/>
-              <a:defRPr sz="1400" kern="1200">
-                <a:ln>
-                  <a:solidFill>
-                    <a:schemeClr val="bg1">
-                      <a:lumMod val="75000"/>
-                      <a:lumOff val="25000"/>
-                      <a:alpha val="10000"/>
-                    </a:schemeClr>
-                  </a:solidFill>
-                </a:ln>
-                <a:solidFill>
-                  <a:schemeClr val="tx2"/>
-                </a:solidFill>
-                <a:effectLst>
-                  <a:outerShdw blurRad="9525" dist="25400" dir="14640000" algn="tl" rotWithShape="0">
-                    <a:schemeClr val="bg1">
-                      <a:alpha val="30000"/>
-                    </a:schemeClr>
-                  </a:outerShdw>
-                </a:effectLst>
-                <a:latin typeface="+mn-lt"/>
-                <a:ea typeface="+mn-ea"/>
-                <a:cs typeface="+mn-cs"/>
-              </a:defRPr>
-            </a:lvl6pPr>
-            <a:lvl7pPr marL="2401800" indent="-228600" algn="l" defTabSz="457200" rtl="0" eaLnBrk="1" latinLnBrk="0" hangingPunct="1">
-              <a:spcBef>
-                <a:spcPct val="20000"/>
-              </a:spcBef>
-              <a:spcAft>
-                <a:spcPts val="600"/>
-              </a:spcAft>
-              <a:buClr>
-                <a:schemeClr val="tx2"/>
-              </a:buClr>
-              <a:buSzPct val="70000"/>
-              <a:buFont typeface="Wingdings 2" charset="2"/>
-              <a:buChar char=""/>
-              <a:defRPr sz="1400" kern="1200">
-                <a:ln>
-                  <a:solidFill>
-                    <a:schemeClr val="bg1">
-                      <a:lumMod val="75000"/>
-                      <a:lumOff val="25000"/>
-                      <a:alpha val="10000"/>
-                    </a:schemeClr>
-                  </a:solidFill>
-                </a:ln>
-                <a:solidFill>
-                  <a:schemeClr val="tx2"/>
-                </a:solidFill>
-                <a:effectLst>
-                  <a:outerShdw blurRad="9525" dist="25400" dir="14640000" algn="tl" rotWithShape="0">
-                    <a:schemeClr val="bg1">
-                      <a:alpha val="30000"/>
-                    </a:schemeClr>
-                  </a:outerShdw>
-                </a:effectLst>
-                <a:latin typeface="+mn-lt"/>
-                <a:ea typeface="+mn-ea"/>
-                <a:cs typeface="+mn-cs"/>
-              </a:defRPr>
-            </a:lvl7pPr>
-            <a:lvl8pPr marL="2789000" indent="-228600" algn="l" defTabSz="457200" rtl="0" eaLnBrk="1" latinLnBrk="0" hangingPunct="1">
-              <a:spcBef>
-                <a:spcPct val="20000"/>
-              </a:spcBef>
-              <a:spcAft>
-                <a:spcPts val="600"/>
-              </a:spcAft>
-              <a:buClr>
-                <a:schemeClr val="tx2"/>
-              </a:buClr>
-              <a:buSzPct val="70000"/>
-              <a:buFont typeface="Wingdings 2" charset="2"/>
-              <a:buChar char=""/>
-              <a:defRPr sz="1400" kern="1200">
-                <a:ln>
-                  <a:solidFill>
-                    <a:schemeClr val="bg1">
-                      <a:lumMod val="75000"/>
-                      <a:lumOff val="25000"/>
-                      <a:alpha val="10000"/>
-                    </a:schemeClr>
-                  </a:solidFill>
-                </a:ln>
-                <a:solidFill>
-                  <a:schemeClr val="tx2"/>
-                </a:solidFill>
-                <a:effectLst>
-                  <a:outerShdw blurRad="9525" dist="25400" dir="14640000" algn="tl" rotWithShape="0">
-                    <a:schemeClr val="bg1">
-                      <a:alpha val="30000"/>
-                    </a:schemeClr>
-                  </a:outerShdw>
-                </a:effectLst>
-                <a:latin typeface="+mn-lt"/>
-                <a:ea typeface="+mn-ea"/>
-                <a:cs typeface="+mn-cs"/>
-              </a:defRPr>
-            </a:lvl8pPr>
-            <a:lvl9pPr marL="3106200" indent="-228600" algn="l" defTabSz="457200" rtl="0" eaLnBrk="1" latinLnBrk="0" hangingPunct="1">
-              <a:spcBef>
-                <a:spcPct val="20000"/>
-              </a:spcBef>
-              <a:spcAft>
-                <a:spcPts val="600"/>
-              </a:spcAft>
-              <a:buClr>
-                <a:schemeClr val="tx2"/>
-              </a:buClr>
-              <a:buSzPct val="70000"/>
-              <a:buFont typeface="Wingdings 2" charset="2"/>
-              <a:buChar char=""/>
-              <a:defRPr sz="1400" kern="1200">
-                <a:ln>
-                  <a:solidFill>
-                    <a:schemeClr val="bg1">
-                      <a:lumMod val="75000"/>
-                      <a:lumOff val="25000"/>
-                      <a:alpha val="10000"/>
-                    </a:schemeClr>
-                  </a:solidFill>
-                </a:ln>
-                <a:solidFill>
-                  <a:schemeClr val="tx2"/>
-                </a:solidFill>
-                <a:effectLst>
-                  <a:outerShdw blurRad="9525" dist="25400" dir="14640000" algn="tl" rotWithShape="0">
-                    <a:schemeClr val="bg1">
-                      <a:alpha val="30000"/>
-                    </a:schemeClr>
-                  </a:outerShdw>
-                </a:effectLst>
-                <a:latin typeface="+mn-lt"/>
-                <a:ea typeface="+mn-ea"/>
-                <a:cs typeface="+mn-cs"/>
-              </a:defRPr>
-            </a:lvl9pPr>
-          </a:lstStyle>
-          <a:p>
-            <a:pPr marL="36900" indent="0">
-              <a:buClr>
-                <a:srgbClr val="A629E7"/>
-              </a:buClr>
-              <a:buNone/>
-            </a:pPr>
-            <a:r>
-              <a:rPr lang="en-AU" sz="2800" b="1" dirty="0">
-                <a:effectLst/>
-              </a:rPr>
-              <a:t>For each letter in a plaintext, there are 26 options.</a:t>
-            </a:r>
-          </a:p>
-          <a:p>
-            <a:pPr marL="36900" indent="0">
-              <a:buClr>
-                <a:srgbClr val="A629E7"/>
-              </a:buClr>
-              <a:buNone/>
-            </a:pPr>
-            <a:r>
-              <a:rPr lang="en-AU" sz="2800" b="1" dirty="0"/>
-              <a:t>key space: 26^n (n is the key length)</a:t>
-            </a:r>
-          </a:p>
-          <a:p>
-            <a:pPr marL="36900" indent="0">
-              <a:buClr>
-                <a:srgbClr val="A629E7"/>
-              </a:buClr>
-              <a:buNone/>
-            </a:pPr>
-            <a:endParaRPr lang="en-AU" sz="2800" b="1" dirty="0">
-              <a:effectLst/>
-            </a:endParaRPr>
-          </a:p>
-          <a:p>
-            <a:pPr marL="36900" indent="0">
-              <a:buClr>
-                <a:srgbClr val="A629E7"/>
-              </a:buClr>
-              <a:buNone/>
-            </a:pPr>
-            <a:endParaRPr lang="en-AU" sz="2800" b="1" dirty="0">
-              <a:effectLst/>
-            </a:endParaRPr>
-          </a:p>
-          <a:p>
-            <a:pPr marL="36900" indent="0">
-              <a:buClr>
-                <a:srgbClr val="A629E7"/>
-              </a:buClr>
-              <a:buNone/>
-            </a:pPr>
-            <a:endParaRPr lang="en-AU" b="1" dirty="0">
-              <a:effectLst/>
-            </a:endParaRPr>
-          </a:p>
-        </p:txBody>
-      </p:sp>
-      <p:sp>
-        <p:nvSpPr>
-          <p:cNvPr id="8" name="Content Placeholder 2">
-            <a:extLst>
-              <a:ext uri="{FF2B5EF4-FFF2-40B4-BE49-F238E27FC236}">
-                <a16:creationId xmlns:a16="http://schemas.microsoft.com/office/drawing/2014/main" id="{25BF1927-C840-4DB6-9454-7DB759C7F20B}"/>
-              </a:ext>
-            </a:extLst>
-          </p:cNvPr>
-          <p:cNvSpPr txBox="1">
-            <a:spLocks/>
-          </p:cNvSpPr>
-          <p:nvPr/>
-        </p:nvSpPr>
-        <p:spPr>
-          <a:xfrm>
-            <a:off x="831437" y="4150537"/>
-            <a:ext cx="8759130" cy="984250"/>
-          </a:xfrm>
-          <a:prstGeom prst="rect">
-            <a:avLst/>
-          </a:prstGeom>
-          <a:effectLst>
-            <a:outerShdw blurRad="25400" dir="17880000">
-              <a:srgbClr val="000000">
-                <a:alpha val="46000"/>
-              </a:srgbClr>
-            </a:outerShdw>
-          </a:effectLst>
-        </p:spPr>
-        <p:txBody>
-          <a:bodyPr vert="horz" lIns="91440" tIns="45720" rIns="91440" bIns="45720" rtlCol="0" anchor="t">
-            <a:normAutofit/>
-          </a:bodyPr>
-          <a:lstStyle>
-            <a:lvl1pPr marL="342900" indent="-306000" algn="l" defTabSz="457200" rtl="0" eaLnBrk="1" latinLnBrk="0" hangingPunct="1">
-              <a:lnSpc>
-                <a:spcPct val="110000"/>
-              </a:lnSpc>
-              <a:spcBef>
-                <a:spcPct val="20000"/>
-              </a:spcBef>
-              <a:spcAft>
-                <a:spcPts val="600"/>
-              </a:spcAft>
-              <a:buClr>
-                <a:schemeClr val="tx2"/>
-              </a:buClr>
-              <a:buSzPct val="70000"/>
-              <a:buFont typeface="Wingdings 2" charset="2"/>
-              <a:buChar char=""/>
-              <a:defRPr sz="2100" b="1" kern="1200">
-                <a:ln>
-                  <a:solidFill>
-                    <a:schemeClr val="bg1">
-                      <a:lumMod val="75000"/>
-                      <a:lumOff val="25000"/>
-                      <a:alpha val="10000"/>
-                    </a:schemeClr>
-                  </a:solidFill>
-                </a:ln>
-                <a:solidFill>
-                  <a:schemeClr val="tx2"/>
-                </a:solidFill>
-                <a:effectLst>
-                  <a:outerShdw blurRad="9525" dist="25400" dir="14640000" algn="tl" rotWithShape="0">
-                    <a:schemeClr val="bg1">
-                      <a:alpha val="30000"/>
-                    </a:schemeClr>
-                  </a:outerShdw>
-                </a:effectLst>
-                <a:latin typeface="+mn-lt"/>
-                <a:ea typeface="+mn-ea"/>
-                <a:cs typeface="+mn-cs"/>
-              </a:defRPr>
-            </a:lvl1pPr>
-            <a:lvl2pPr marL="720000" indent="-270000" algn="l" defTabSz="457200" rtl="0" eaLnBrk="1" latinLnBrk="0" hangingPunct="1">
-              <a:spcBef>
-                <a:spcPct val="20000"/>
-              </a:spcBef>
-              <a:spcAft>
-                <a:spcPts val="600"/>
-              </a:spcAft>
-              <a:buClr>
-                <a:schemeClr val="tx2"/>
-              </a:buClr>
-              <a:buSzPct val="70000"/>
-              <a:buFont typeface="Wingdings 2" charset="2"/>
-              <a:buChar char=""/>
-              <a:defRPr sz="1900" b="1" kern="1200">
-                <a:ln>
-                  <a:solidFill>
-                    <a:schemeClr val="bg1">
-                      <a:lumMod val="75000"/>
-                      <a:lumOff val="25000"/>
-                      <a:alpha val="10000"/>
-                    </a:schemeClr>
-                  </a:solidFill>
-                </a:ln>
-                <a:solidFill>
-                  <a:schemeClr val="tx2"/>
-                </a:solidFill>
-                <a:effectLst>
-                  <a:outerShdw blurRad="9525" dist="25400" dir="14640000" algn="tl" rotWithShape="0">
-                    <a:schemeClr val="bg1">
-                      <a:alpha val="30000"/>
-                    </a:schemeClr>
-                  </a:outerShdw>
-                </a:effectLst>
-                <a:latin typeface="+mn-lt"/>
-                <a:ea typeface="+mn-ea"/>
-                <a:cs typeface="+mn-cs"/>
-              </a:defRPr>
-            </a:lvl2pPr>
-            <a:lvl3pPr marL="1026000" indent="-216000" algn="l" defTabSz="457200" rtl="0" eaLnBrk="1" latinLnBrk="0" hangingPunct="1">
-              <a:spcBef>
-                <a:spcPct val="20000"/>
-              </a:spcBef>
-              <a:spcAft>
-                <a:spcPts val="600"/>
-              </a:spcAft>
-              <a:buClr>
-                <a:schemeClr val="tx2"/>
-              </a:buClr>
-              <a:buSzPct val="70000"/>
-              <a:buFont typeface="Wingdings 2" charset="2"/>
-              <a:buChar char=""/>
-              <a:defRPr sz="1700" b="1" kern="1200">
-                <a:ln>
-                  <a:solidFill>
-                    <a:schemeClr val="bg1">
-                      <a:lumMod val="75000"/>
-                      <a:lumOff val="25000"/>
-                      <a:alpha val="10000"/>
-                    </a:schemeClr>
-                  </a:solidFill>
-                </a:ln>
-                <a:solidFill>
-                  <a:schemeClr val="tx2"/>
-                </a:solidFill>
-                <a:effectLst>
-                  <a:outerShdw blurRad="9525" dist="25400" dir="14640000" algn="tl" rotWithShape="0">
-                    <a:schemeClr val="bg1">
-                      <a:alpha val="30000"/>
-                    </a:schemeClr>
-                  </a:outerShdw>
-                </a:effectLst>
-                <a:latin typeface="+mn-lt"/>
-                <a:ea typeface="+mn-ea"/>
-                <a:cs typeface="+mn-cs"/>
-              </a:defRPr>
-            </a:lvl3pPr>
-            <a:lvl4pPr marL="1386000" indent="-216000" algn="l" defTabSz="457200" rtl="0" eaLnBrk="1" latinLnBrk="0" hangingPunct="1">
-              <a:spcBef>
-                <a:spcPct val="20000"/>
-              </a:spcBef>
-              <a:spcAft>
-                <a:spcPts val="600"/>
-              </a:spcAft>
-              <a:buClr>
-                <a:schemeClr val="tx2"/>
-              </a:buClr>
-              <a:buSzPct val="70000"/>
-              <a:buFont typeface="Wingdings 2" charset="2"/>
-              <a:buChar char=""/>
-              <a:defRPr sz="1500" b="1" kern="1200">
-                <a:ln>
-                  <a:solidFill>
-                    <a:schemeClr val="bg1">
-                      <a:lumMod val="75000"/>
-                      <a:lumOff val="25000"/>
-                      <a:alpha val="10000"/>
-                    </a:schemeClr>
-                  </a:solidFill>
-                </a:ln>
-                <a:solidFill>
-                  <a:schemeClr val="tx2"/>
-                </a:solidFill>
-                <a:effectLst>
-                  <a:outerShdw blurRad="9525" dist="25400" dir="14640000" algn="tl" rotWithShape="0">
-                    <a:schemeClr val="bg1">
-                      <a:alpha val="30000"/>
-                    </a:schemeClr>
-                  </a:outerShdw>
-                </a:effectLst>
-                <a:latin typeface="+mn-lt"/>
-                <a:ea typeface="+mn-ea"/>
-                <a:cs typeface="+mn-cs"/>
-              </a:defRPr>
-            </a:lvl4pPr>
-            <a:lvl5pPr marL="1674000" indent="-216000" algn="l" defTabSz="457200" rtl="0" eaLnBrk="1" latinLnBrk="0" hangingPunct="1">
-              <a:spcBef>
-                <a:spcPct val="20000"/>
-              </a:spcBef>
-              <a:spcAft>
-                <a:spcPts val="600"/>
-              </a:spcAft>
-              <a:buClr>
-                <a:schemeClr val="tx2"/>
-              </a:buClr>
-              <a:buSzPct val="70000"/>
-              <a:buFont typeface="Wingdings 2" charset="2"/>
-              <a:buChar char=""/>
-              <a:defRPr sz="1500" b="1" kern="1200">
-                <a:ln>
-                  <a:solidFill>
-                    <a:schemeClr val="bg1">
-                      <a:lumMod val="75000"/>
-                      <a:lumOff val="25000"/>
-                      <a:alpha val="10000"/>
-                    </a:schemeClr>
-                  </a:solidFill>
-                </a:ln>
-                <a:solidFill>
-                  <a:schemeClr val="tx2"/>
-                </a:solidFill>
-                <a:effectLst>
-                  <a:outerShdw blurRad="9525" dist="25400" dir="14640000" algn="tl" rotWithShape="0">
-                    <a:schemeClr val="bg1">
-                      <a:alpha val="30000"/>
-                    </a:schemeClr>
-                  </a:outerShdw>
-                </a:effectLst>
-                <a:latin typeface="+mn-lt"/>
-                <a:ea typeface="+mn-ea"/>
-                <a:cs typeface="+mn-cs"/>
-              </a:defRPr>
-            </a:lvl5pPr>
-            <a:lvl6pPr marL="2014600" indent="-228600" algn="l" defTabSz="457200" rtl="0" eaLnBrk="1" latinLnBrk="0" hangingPunct="1">
-              <a:spcBef>
-                <a:spcPct val="20000"/>
-              </a:spcBef>
-              <a:spcAft>
-                <a:spcPts val="600"/>
-              </a:spcAft>
-              <a:buClr>
-                <a:schemeClr val="tx2"/>
-              </a:buClr>
-              <a:buSzPct val="70000"/>
-              <a:buFont typeface="Wingdings 2" charset="2"/>
-              <a:buChar char=""/>
-              <a:defRPr sz="1400" kern="1200">
-                <a:ln>
-                  <a:solidFill>
-                    <a:schemeClr val="bg1">
-                      <a:lumMod val="75000"/>
-                      <a:lumOff val="25000"/>
-                      <a:alpha val="10000"/>
-                    </a:schemeClr>
-                  </a:solidFill>
-                </a:ln>
-                <a:solidFill>
-                  <a:schemeClr val="tx2"/>
-                </a:solidFill>
-                <a:effectLst>
-                  <a:outerShdw blurRad="9525" dist="25400" dir="14640000" algn="tl" rotWithShape="0">
-                    <a:schemeClr val="bg1">
-                      <a:alpha val="30000"/>
-                    </a:schemeClr>
-                  </a:outerShdw>
-                </a:effectLst>
-                <a:latin typeface="+mn-lt"/>
-                <a:ea typeface="+mn-ea"/>
-                <a:cs typeface="+mn-cs"/>
-              </a:defRPr>
-            </a:lvl6pPr>
-            <a:lvl7pPr marL="2401800" indent="-228600" algn="l" defTabSz="457200" rtl="0" eaLnBrk="1" latinLnBrk="0" hangingPunct="1">
-              <a:spcBef>
-                <a:spcPct val="20000"/>
-              </a:spcBef>
-              <a:spcAft>
-                <a:spcPts val="600"/>
-              </a:spcAft>
-              <a:buClr>
-                <a:schemeClr val="tx2"/>
-              </a:buClr>
-              <a:buSzPct val="70000"/>
-              <a:buFont typeface="Wingdings 2" charset="2"/>
-              <a:buChar char=""/>
-              <a:defRPr sz="1400" kern="1200">
-                <a:ln>
-                  <a:solidFill>
-                    <a:schemeClr val="bg1">
-                      <a:lumMod val="75000"/>
-                      <a:lumOff val="25000"/>
-                      <a:alpha val="10000"/>
-                    </a:schemeClr>
-                  </a:solidFill>
-                </a:ln>
-                <a:solidFill>
-                  <a:schemeClr val="tx2"/>
-                </a:solidFill>
-                <a:effectLst>
-                  <a:outerShdw blurRad="9525" dist="25400" dir="14640000" algn="tl" rotWithShape="0">
-                    <a:schemeClr val="bg1">
-                      <a:alpha val="30000"/>
-                    </a:schemeClr>
-                  </a:outerShdw>
-                </a:effectLst>
-                <a:latin typeface="+mn-lt"/>
-                <a:ea typeface="+mn-ea"/>
-                <a:cs typeface="+mn-cs"/>
-              </a:defRPr>
-            </a:lvl7pPr>
-            <a:lvl8pPr marL="2789000" indent="-228600" algn="l" defTabSz="457200" rtl="0" eaLnBrk="1" latinLnBrk="0" hangingPunct="1">
-              <a:spcBef>
-                <a:spcPct val="20000"/>
-              </a:spcBef>
-              <a:spcAft>
-                <a:spcPts val="600"/>
-              </a:spcAft>
-              <a:buClr>
-                <a:schemeClr val="tx2"/>
-              </a:buClr>
-              <a:buSzPct val="70000"/>
-              <a:buFont typeface="Wingdings 2" charset="2"/>
-              <a:buChar char=""/>
-              <a:defRPr sz="1400" kern="1200">
-                <a:ln>
-                  <a:solidFill>
-                    <a:schemeClr val="bg1">
-                      <a:lumMod val="75000"/>
-                      <a:lumOff val="25000"/>
-                      <a:alpha val="10000"/>
-                    </a:schemeClr>
-                  </a:solidFill>
-                </a:ln>
-                <a:solidFill>
-                  <a:schemeClr val="tx2"/>
-                </a:solidFill>
-                <a:effectLst>
-                  <a:outerShdw blurRad="9525" dist="25400" dir="14640000" algn="tl" rotWithShape="0">
-                    <a:schemeClr val="bg1">
-                      <a:alpha val="30000"/>
-                    </a:schemeClr>
-                  </a:outerShdw>
-                </a:effectLst>
-                <a:latin typeface="+mn-lt"/>
-                <a:ea typeface="+mn-ea"/>
-                <a:cs typeface="+mn-cs"/>
-              </a:defRPr>
-            </a:lvl8pPr>
-            <a:lvl9pPr marL="3106200" indent="-228600" algn="l" defTabSz="457200" rtl="0" eaLnBrk="1" latinLnBrk="0" hangingPunct="1">
-              <a:spcBef>
-                <a:spcPct val="20000"/>
-              </a:spcBef>
-              <a:spcAft>
-                <a:spcPts val="600"/>
-              </a:spcAft>
-              <a:buClr>
-                <a:schemeClr val="tx2"/>
-              </a:buClr>
-              <a:buSzPct val="70000"/>
-              <a:buFont typeface="Wingdings 2" charset="2"/>
-              <a:buChar char=""/>
-              <a:defRPr sz="1400" kern="1200">
-                <a:ln>
-                  <a:solidFill>
-                    <a:schemeClr val="bg1">
-                      <a:lumMod val="75000"/>
-                      <a:lumOff val="25000"/>
-                      <a:alpha val="10000"/>
-                    </a:schemeClr>
-                  </a:solidFill>
-                </a:ln>
-                <a:solidFill>
-                  <a:schemeClr val="tx2"/>
-                </a:solidFill>
-                <a:effectLst>
-                  <a:outerShdw blurRad="9525" dist="25400" dir="14640000" algn="tl" rotWithShape="0">
-                    <a:schemeClr val="bg1">
-                      <a:alpha val="30000"/>
-                    </a:schemeClr>
-                  </a:outerShdw>
-                </a:effectLst>
-                <a:latin typeface="+mn-lt"/>
-                <a:ea typeface="+mn-ea"/>
-                <a:cs typeface="+mn-cs"/>
-              </a:defRPr>
-            </a:lvl9pPr>
-          </a:lstStyle>
-          <a:p>
-            <a:r>
-              <a:rPr lang="en-AU" sz="2800" dirty="0"/>
-              <a:t>Monoalphabetic cipher: single alphabet for substitution</a:t>
-            </a:r>
-          </a:p>
-        </p:txBody>
-      </p:sp>
-      <p:sp>
-        <p:nvSpPr>
-          <p:cNvPr id="10" name="Content Placeholder 2">
-            <a:extLst>
-              <a:ext uri="{FF2B5EF4-FFF2-40B4-BE49-F238E27FC236}">
-                <a16:creationId xmlns:a16="http://schemas.microsoft.com/office/drawing/2014/main" id="{4CFF5C30-A899-4FEC-889F-6D931EF7756C}"/>
-              </a:ext>
-            </a:extLst>
-          </p:cNvPr>
-          <p:cNvSpPr txBox="1">
-            <a:spLocks/>
-          </p:cNvSpPr>
-          <p:nvPr/>
-        </p:nvSpPr>
-        <p:spPr>
-          <a:xfrm>
-            <a:off x="913795" y="4805400"/>
-            <a:ext cx="9314726" cy="3067346"/>
-          </a:xfrm>
-          <a:prstGeom prst="rect">
-            <a:avLst/>
-          </a:prstGeom>
-          <a:effectLst>
-            <a:outerShdw blurRad="25400" dir="17880000">
-              <a:srgbClr val="000000">
-                <a:alpha val="46000"/>
-              </a:srgbClr>
-            </a:outerShdw>
-          </a:effectLst>
-        </p:spPr>
-        <p:txBody>
-          <a:bodyPr vert="horz" lIns="91440" tIns="45720" rIns="91440" bIns="45720" rtlCol="0" anchor="ctr">
-            <a:normAutofit/>
-          </a:bodyPr>
-          <a:lstStyle>
-            <a:lvl1pPr marL="342900" indent="-306000" algn="l" defTabSz="457200" rtl="0" eaLnBrk="1" latinLnBrk="0" hangingPunct="1">
-              <a:lnSpc>
-                <a:spcPct val="110000"/>
-              </a:lnSpc>
-              <a:spcBef>
-                <a:spcPct val="20000"/>
-              </a:spcBef>
-              <a:spcAft>
-                <a:spcPts val="600"/>
-              </a:spcAft>
-              <a:buClr>
-                <a:schemeClr val="tx2"/>
-              </a:buClr>
-              <a:buSzPct val="70000"/>
-              <a:buFont typeface="Wingdings 2" charset="2"/>
-              <a:buChar char=""/>
-              <a:defRPr sz="2100" kern="1200">
-                <a:ln>
-                  <a:solidFill>
-                    <a:schemeClr val="bg1">
-                      <a:lumMod val="75000"/>
-                      <a:lumOff val="25000"/>
-                      <a:alpha val="10000"/>
-                    </a:schemeClr>
-                  </a:solidFill>
-                </a:ln>
-                <a:solidFill>
-                  <a:schemeClr val="tx2"/>
-                </a:solidFill>
-                <a:effectLst>
-                  <a:outerShdw blurRad="9525" dist="25400" dir="14640000" algn="tl" rotWithShape="0">
-                    <a:schemeClr val="bg1">
-                      <a:alpha val="30000"/>
-                    </a:schemeClr>
-                  </a:outerShdw>
-                </a:effectLst>
-                <a:latin typeface="+mn-lt"/>
-                <a:ea typeface="+mn-ea"/>
-                <a:cs typeface="+mn-cs"/>
-              </a:defRPr>
-            </a:lvl1pPr>
-            <a:lvl2pPr marL="720000" indent="-270000" algn="l" defTabSz="457200" rtl="0" eaLnBrk="1" latinLnBrk="0" hangingPunct="1">
-              <a:spcBef>
-                <a:spcPct val="20000"/>
-              </a:spcBef>
-              <a:spcAft>
-                <a:spcPts val="600"/>
-              </a:spcAft>
-              <a:buClr>
-                <a:schemeClr val="tx2"/>
-              </a:buClr>
-              <a:buSzPct val="70000"/>
-              <a:buFont typeface="Wingdings 2" charset="2"/>
-              <a:buChar char=""/>
-              <a:defRPr sz="1900" kern="1200">
-                <a:ln>
-                  <a:solidFill>
-                    <a:schemeClr val="bg1">
-                      <a:lumMod val="75000"/>
-                      <a:lumOff val="25000"/>
-                      <a:alpha val="10000"/>
-                    </a:schemeClr>
-                  </a:solidFill>
-                </a:ln>
-                <a:solidFill>
-                  <a:schemeClr val="tx2"/>
-                </a:solidFill>
-                <a:effectLst>
-                  <a:outerShdw blurRad="9525" dist="25400" dir="14640000" algn="tl" rotWithShape="0">
-                    <a:schemeClr val="bg1">
-                      <a:alpha val="30000"/>
-                    </a:schemeClr>
-                  </a:outerShdw>
-                </a:effectLst>
-                <a:latin typeface="+mn-lt"/>
-                <a:ea typeface="+mn-ea"/>
-                <a:cs typeface="+mn-cs"/>
-              </a:defRPr>
-            </a:lvl2pPr>
-            <a:lvl3pPr marL="1026000" indent="-216000" algn="l" defTabSz="457200" rtl="0" eaLnBrk="1" latinLnBrk="0" hangingPunct="1">
-              <a:spcBef>
-                <a:spcPct val="20000"/>
-              </a:spcBef>
-              <a:spcAft>
-                <a:spcPts val="600"/>
-              </a:spcAft>
-              <a:buClr>
-                <a:schemeClr val="tx2"/>
-              </a:buClr>
-              <a:buSzPct val="70000"/>
-              <a:buFont typeface="Wingdings 2" charset="2"/>
-              <a:buChar char=""/>
-              <a:defRPr sz="1700" kern="1200">
-                <a:ln>
-                  <a:solidFill>
-                    <a:schemeClr val="bg1">
-                      <a:lumMod val="75000"/>
-                      <a:lumOff val="25000"/>
-                      <a:alpha val="10000"/>
-                    </a:schemeClr>
-                  </a:solidFill>
-                </a:ln>
-                <a:solidFill>
-                  <a:schemeClr val="tx2"/>
-                </a:solidFill>
-                <a:effectLst>
-                  <a:outerShdw blurRad="9525" dist="25400" dir="14640000" algn="tl" rotWithShape="0">
-                    <a:schemeClr val="bg1">
-                      <a:alpha val="30000"/>
-                    </a:schemeClr>
-                  </a:outerShdw>
-                </a:effectLst>
-                <a:latin typeface="+mn-lt"/>
-                <a:ea typeface="+mn-ea"/>
-                <a:cs typeface="+mn-cs"/>
-              </a:defRPr>
-            </a:lvl3pPr>
-            <a:lvl4pPr marL="1386000" indent="-216000" algn="l" defTabSz="457200" rtl="0" eaLnBrk="1" latinLnBrk="0" hangingPunct="1">
-              <a:spcBef>
-                <a:spcPct val="20000"/>
-              </a:spcBef>
-              <a:spcAft>
-                <a:spcPts val="600"/>
-              </a:spcAft>
-              <a:buClr>
-                <a:schemeClr val="tx2"/>
-              </a:buClr>
-              <a:buSzPct val="70000"/>
-              <a:buFont typeface="Wingdings 2" charset="2"/>
-              <a:buChar char=""/>
-              <a:defRPr sz="1500" kern="1200">
-                <a:ln>
-                  <a:solidFill>
-                    <a:schemeClr val="bg1">
-                      <a:lumMod val="75000"/>
-                      <a:lumOff val="25000"/>
-                      <a:alpha val="10000"/>
-                    </a:schemeClr>
-                  </a:solidFill>
-                </a:ln>
-                <a:solidFill>
-                  <a:schemeClr val="tx2"/>
-                </a:solidFill>
-                <a:effectLst>
-                  <a:outerShdw blurRad="9525" dist="25400" dir="14640000" algn="tl" rotWithShape="0">
-                    <a:schemeClr val="bg1">
-                      <a:alpha val="30000"/>
-                    </a:schemeClr>
-                  </a:outerShdw>
-                </a:effectLst>
-                <a:latin typeface="+mn-lt"/>
-                <a:ea typeface="+mn-ea"/>
-                <a:cs typeface="+mn-cs"/>
-              </a:defRPr>
-            </a:lvl4pPr>
-            <a:lvl5pPr marL="1674000" indent="-216000" algn="l" defTabSz="457200" rtl="0" eaLnBrk="1" latinLnBrk="0" hangingPunct="1">
-              <a:spcBef>
-                <a:spcPct val="20000"/>
-              </a:spcBef>
-              <a:spcAft>
-                <a:spcPts val="600"/>
-              </a:spcAft>
-              <a:buClr>
-                <a:schemeClr val="tx2"/>
-              </a:buClr>
-              <a:buSzPct val="70000"/>
-              <a:buFont typeface="Wingdings 2" charset="2"/>
-              <a:buChar char=""/>
-              <a:defRPr sz="1500" kern="1200">
-                <a:ln>
-                  <a:solidFill>
-                    <a:schemeClr val="bg1">
-                      <a:lumMod val="75000"/>
-                      <a:lumOff val="25000"/>
-                      <a:alpha val="10000"/>
-                    </a:schemeClr>
-                  </a:solidFill>
-                </a:ln>
-                <a:solidFill>
-                  <a:schemeClr val="tx2"/>
-                </a:solidFill>
-                <a:effectLst>
-                  <a:outerShdw blurRad="9525" dist="25400" dir="14640000" algn="tl" rotWithShape="0">
-                    <a:schemeClr val="bg1">
-                      <a:alpha val="30000"/>
-                    </a:schemeClr>
-                  </a:outerShdw>
-                </a:effectLst>
-                <a:latin typeface="+mn-lt"/>
-                <a:ea typeface="+mn-ea"/>
-                <a:cs typeface="+mn-cs"/>
-              </a:defRPr>
-            </a:lvl5pPr>
-            <a:lvl6pPr marL="2014600" indent="-228600" algn="l" defTabSz="457200" rtl="0" eaLnBrk="1" latinLnBrk="0" hangingPunct="1">
-              <a:spcBef>
-                <a:spcPct val="20000"/>
-              </a:spcBef>
-              <a:spcAft>
-                <a:spcPts val="600"/>
-              </a:spcAft>
-              <a:buClr>
-                <a:schemeClr val="tx2"/>
-              </a:buClr>
-              <a:buSzPct val="70000"/>
-              <a:buFont typeface="Wingdings 2" charset="2"/>
-              <a:buChar char=""/>
-              <a:defRPr sz="1400" kern="1200">
-                <a:ln>
-                  <a:solidFill>
-                    <a:schemeClr val="bg1">
-                      <a:lumMod val="75000"/>
-                      <a:lumOff val="25000"/>
-                      <a:alpha val="10000"/>
-                    </a:schemeClr>
-                  </a:solidFill>
-                </a:ln>
-                <a:solidFill>
-                  <a:schemeClr val="tx2"/>
-                </a:solidFill>
-                <a:effectLst>
-                  <a:outerShdw blurRad="9525" dist="25400" dir="14640000" algn="tl" rotWithShape="0">
-                    <a:schemeClr val="bg1">
-                      <a:alpha val="30000"/>
-                    </a:schemeClr>
-                  </a:outerShdw>
-                </a:effectLst>
-                <a:latin typeface="+mn-lt"/>
-                <a:ea typeface="+mn-ea"/>
-                <a:cs typeface="+mn-cs"/>
-              </a:defRPr>
-            </a:lvl6pPr>
-            <a:lvl7pPr marL="2401800" indent="-228600" algn="l" defTabSz="457200" rtl="0" eaLnBrk="1" latinLnBrk="0" hangingPunct="1">
-              <a:spcBef>
-                <a:spcPct val="20000"/>
-              </a:spcBef>
-              <a:spcAft>
-                <a:spcPts val="600"/>
-              </a:spcAft>
-              <a:buClr>
-                <a:schemeClr val="tx2"/>
-              </a:buClr>
-              <a:buSzPct val="70000"/>
-              <a:buFont typeface="Wingdings 2" charset="2"/>
-              <a:buChar char=""/>
-              <a:defRPr sz="1400" kern="1200">
-                <a:ln>
-                  <a:solidFill>
-                    <a:schemeClr val="bg1">
-                      <a:lumMod val="75000"/>
-                      <a:lumOff val="25000"/>
-                      <a:alpha val="10000"/>
-                    </a:schemeClr>
-                  </a:solidFill>
-                </a:ln>
-                <a:solidFill>
-                  <a:schemeClr val="tx2"/>
-                </a:solidFill>
-                <a:effectLst>
-                  <a:outerShdw blurRad="9525" dist="25400" dir="14640000" algn="tl" rotWithShape="0">
-                    <a:schemeClr val="bg1">
-                      <a:alpha val="30000"/>
-                    </a:schemeClr>
-                  </a:outerShdw>
-                </a:effectLst>
-                <a:latin typeface="+mn-lt"/>
-                <a:ea typeface="+mn-ea"/>
-                <a:cs typeface="+mn-cs"/>
-              </a:defRPr>
-            </a:lvl7pPr>
-            <a:lvl8pPr marL="2789000" indent="-228600" algn="l" defTabSz="457200" rtl="0" eaLnBrk="1" latinLnBrk="0" hangingPunct="1">
-              <a:spcBef>
-                <a:spcPct val="20000"/>
-              </a:spcBef>
-              <a:spcAft>
-                <a:spcPts val="600"/>
-              </a:spcAft>
-              <a:buClr>
-                <a:schemeClr val="tx2"/>
-              </a:buClr>
-              <a:buSzPct val="70000"/>
-              <a:buFont typeface="Wingdings 2" charset="2"/>
-              <a:buChar char=""/>
-              <a:defRPr sz="1400" kern="1200">
-                <a:ln>
-                  <a:solidFill>
-                    <a:schemeClr val="bg1">
-                      <a:lumMod val="75000"/>
-                      <a:lumOff val="25000"/>
-                      <a:alpha val="10000"/>
-                    </a:schemeClr>
-                  </a:solidFill>
-                </a:ln>
-                <a:solidFill>
-                  <a:schemeClr val="tx2"/>
-                </a:solidFill>
-                <a:effectLst>
-                  <a:outerShdw blurRad="9525" dist="25400" dir="14640000" algn="tl" rotWithShape="0">
-                    <a:schemeClr val="bg1">
-                      <a:alpha val="30000"/>
-                    </a:schemeClr>
-                  </a:outerShdw>
-                </a:effectLst>
-                <a:latin typeface="+mn-lt"/>
-                <a:ea typeface="+mn-ea"/>
-                <a:cs typeface="+mn-cs"/>
-              </a:defRPr>
-            </a:lvl8pPr>
-            <a:lvl9pPr marL="3106200" indent="-228600" algn="l" defTabSz="457200" rtl="0" eaLnBrk="1" latinLnBrk="0" hangingPunct="1">
-              <a:spcBef>
-                <a:spcPct val="20000"/>
-              </a:spcBef>
-              <a:spcAft>
-                <a:spcPts val="600"/>
-              </a:spcAft>
-              <a:buClr>
-                <a:schemeClr val="tx2"/>
-              </a:buClr>
-              <a:buSzPct val="70000"/>
-              <a:buFont typeface="Wingdings 2" charset="2"/>
-              <a:buChar char=""/>
-              <a:defRPr sz="1400" kern="1200">
-                <a:ln>
-                  <a:solidFill>
-                    <a:schemeClr val="bg1">
-                      <a:lumMod val="75000"/>
-                      <a:lumOff val="25000"/>
-                      <a:alpha val="10000"/>
-                    </a:schemeClr>
-                  </a:solidFill>
-                </a:ln>
-                <a:solidFill>
-                  <a:schemeClr val="tx2"/>
-                </a:solidFill>
-                <a:effectLst>
-                  <a:outerShdw blurRad="9525" dist="25400" dir="14640000" algn="tl" rotWithShape="0">
-                    <a:schemeClr val="bg1">
-                      <a:alpha val="30000"/>
-                    </a:schemeClr>
-                  </a:outerShdw>
-                </a:effectLst>
-                <a:latin typeface="+mn-lt"/>
-                <a:ea typeface="+mn-ea"/>
-                <a:cs typeface="+mn-cs"/>
-              </a:defRPr>
-            </a:lvl9pPr>
-          </a:lstStyle>
-          <a:p>
-            <a:pPr marL="36900" indent="0">
-              <a:buClr>
-                <a:srgbClr val="A629E7"/>
-              </a:buClr>
-              <a:buNone/>
-            </a:pPr>
-            <a:r>
-              <a:rPr lang="en-AU" sz="2800" b="1" dirty="0">
-                <a:effectLst/>
-              </a:rPr>
-              <a:t>For each unique letter in a plaintext, there are 26 options.</a:t>
-            </a:r>
-          </a:p>
-          <a:p>
-            <a:pPr marL="36900" indent="0">
-              <a:buClr>
-                <a:srgbClr val="A629E7"/>
-              </a:buClr>
-              <a:buNone/>
-            </a:pPr>
-            <a:r>
-              <a:rPr lang="en-AU" sz="2800" b="1" dirty="0"/>
-              <a:t>key space</a:t>
-            </a:r>
-            <a:r>
-              <a:rPr lang="en-AU" sz="2800" b="1"/>
-              <a:t>: 26!</a:t>
-            </a:r>
-            <a:endParaRPr lang="en-AU" sz="2800" b="1" dirty="0"/>
-          </a:p>
-          <a:p>
-            <a:pPr marL="36900" indent="0">
-              <a:buClr>
-                <a:srgbClr val="A629E7"/>
-              </a:buClr>
-              <a:buNone/>
-            </a:pPr>
-            <a:endParaRPr lang="en-AU" sz="2800" b="1" dirty="0">
-              <a:effectLst/>
-            </a:endParaRPr>
-          </a:p>
-          <a:p>
-            <a:pPr marL="36900" indent="0">
-              <a:buClr>
-                <a:srgbClr val="A629E7"/>
-              </a:buClr>
-              <a:buNone/>
-            </a:pPr>
-            <a:endParaRPr lang="en-AU" sz="2800" b="1" dirty="0">
-              <a:effectLst/>
-            </a:endParaRPr>
-          </a:p>
-          <a:p>
-            <a:pPr marL="36900" indent="0">
-              <a:buClr>
-                <a:srgbClr val="A629E7"/>
-              </a:buClr>
-              <a:buNone/>
-            </a:pPr>
-            <a:endParaRPr lang="en-AU" b="1" dirty="0">
-              <a:effectLst/>
-            </a:endParaRPr>
-          </a:p>
-        </p:txBody>
-      </p:sp>
-    </p:spTree>
-    <p:extLst>
-      <p:ext uri="{BB962C8B-B14F-4D97-AF65-F5344CB8AC3E}">
-        <p14:creationId xmlns:p14="http://schemas.microsoft.com/office/powerpoint/2010/main" val="1696639929"/>
-      </p:ext>
-    </p:extLst>
-  </p:cSld>
-  <p:clrMapOvr>
-    <a:masterClrMapping/>
-  </p:clrMapOvr>
-</p:sld>
-</file>
-
-<file path=ppt/slides/slide34.xml><?xml version="1.0" encoding="utf-8"?>
-<p:sld xmlns:a="http://schemas.openxmlformats.org/drawingml/2006/main" xmlns:r="http://schemas.openxmlformats.org/officeDocument/2006/relationships" xmlns:p="http://schemas.openxmlformats.org/presentationml/2006/main">
-  <p:cSld>
-    <p:spTree>
-      <p:nvGrpSpPr>
-        <p:cNvPr id="1" name=""/>
-        <p:cNvGrpSpPr/>
-        <p:nvPr/>
-      </p:nvGrpSpPr>
-      <p:grpSpPr>
-        <a:xfrm>
-          <a:off x="0" y="0"/>
-          <a:ext cx="0" cy="0"/>
-          <a:chOff x="0" y="0"/>
-          <a:chExt cx="0" cy="0"/>
-        </a:xfrm>
-      </p:grpSpPr>
-      <p:sp>
-        <p:nvSpPr>
-          <p:cNvPr id="3" name="Slide Number Placeholder 2"/>
-          <p:cNvSpPr>
-            <a:spLocks noGrp="1"/>
-          </p:cNvSpPr>
-          <p:nvPr>
-            <p:ph type="sldNum" sz="quarter" idx="12"/>
-          </p:nvPr>
-        </p:nvSpPr>
-        <p:spPr/>
-        <p:txBody>
-          <a:bodyPr/>
-          <a:lstStyle/>
-          <a:p>
-            <a:fld id="{55670E94-029C-4BA8-8D44-FBB339E4924F}" type="slidenum">
-              <a:rPr lang="en-AU" smtClean="0">
-                <a:solidFill>
-                  <a:prstClr val="black">
-                    <a:tint val="75000"/>
-                  </a:prstClr>
-                </a:solidFill>
-              </a:rPr>
-              <a:pPr/>
-              <a:t>34</a:t>
-            </a:fld>
-            <a:endParaRPr lang="en-AU" dirty="0">
-              <a:solidFill>
-                <a:prstClr val="black">
-                  <a:tint val="75000"/>
-                </a:prstClr>
-              </a:solidFill>
-            </a:endParaRPr>
-          </a:p>
-        </p:txBody>
-      </p:sp>
-      <p:sp>
-        <p:nvSpPr>
-          <p:cNvPr id="5" name="Content Placeholder 1">
-            <a:extLst>
-              <a:ext uri="{FF2B5EF4-FFF2-40B4-BE49-F238E27FC236}">
-                <a16:creationId xmlns:a16="http://schemas.microsoft.com/office/drawing/2014/main" id="{08106222-633E-4F94-9E9F-49816C6A13D2}"/>
-              </a:ext>
-            </a:extLst>
-          </p:cNvPr>
-          <p:cNvSpPr>
-            <a:spLocks noGrp="1"/>
-          </p:cNvSpPr>
-          <p:nvPr>
-            <p:ph idx="1"/>
-          </p:nvPr>
-        </p:nvSpPr>
-        <p:spPr>
-          <a:xfrm>
-            <a:off x="97465" y="857251"/>
-            <a:ext cx="10726270" cy="1068569"/>
-          </a:xfrm>
-        </p:spPr>
-        <p:txBody>
-          <a:bodyPr>
-            <a:normAutofit fontScale="92500" lnSpcReduction="10000"/>
-          </a:bodyPr>
-          <a:lstStyle/>
-          <a:p>
-            <a:pPr marL="450000" lvl="1" indent="0">
-              <a:buNone/>
-            </a:pPr>
-            <a:endParaRPr lang="en-AU" sz="2800" dirty="0"/>
-          </a:p>
-          <a:p>
-            <a:pPr lvl="1"/>
-            <a:r>
-              <a:rPr lang="en-AU" sz="2800" dirty="0"/>
-              <a:t>Q5: crypto mess</a:t>
-            </a:r>
-          </a:p>
-          <a:p>
-            <a:pPr marL="810000" lvl="2" indent="0">
-              <a:buNone/>
-            </a:pPr>
-            <a:endParaRPr lang="en-AU" sz="2800" dirty="0"/>
-          </a:p>
-        </p:txBody>
-      </p:sp>
-      <p:sp>
-        <p:nvSpPr>
-          <p:cNvPr id="7" name="Title 3">
-            <a:extLst>
-              <a:ext uri="{FF2B5EF4-FFF2-40B4-BE49-F238E27FC236}">
-                <a16:creationId xmlns:a16="http://schemas.microsoft.com/office/drawing/2014/main" id="{7AF2CD78-8763-4C94-B120-CC8C0B08A844}"/>
-              </a:ext>
-            </a:extLst>
-          </p:cNvPr>
-          <p:cNvSpPr>
-            <a:spLocks noGrp="1"/>
-          </p:cNvSpPr>
-          <p:nvPr>
-            <p:ph type="title"/>
-          </p:nvPr>
-        </p:nvSpPr>
-        <p:spPr>
-          <a:xfrm>
-            <a:off x="1561495" y="0"/>
-            <a:ext cx="8725505" cy="1257300"/>
-          </a:xfrm>
-        </p:spPr>
-        <p:txBody>
-          <a:bodyPr/>
-          <a:lstStyle/>
-          <a:p>
-            <a:r>
-              <a:rPr lang="en-AU" dirty="0"/>
-              <a:t>Lab 2</a:t>
-            </a:r>
-          </a:p>
-        </p:txBody>
-      </p:sp>
-      <p:pic>
-        <p:nvPicPr>
-          <p:cNvPr id="6" name="Picture 5">
-            <a:extLst>
-              <a:ext uri="{FF2B5EF4-FFF2-40B4-BE49-F238E27FC236}">
-                <a16:creationId xmlns:a16="http://schemas.microsoft.com/office/drawing/2014/main" id="{69420840-81B5-4296-9E12-752B1EE5EE58}"/>
-              </a:ext>
-            </a:extLst>
-          </p:cNvPr>
-          <p:cNvPicPr>
-            <a:picLocks noChangeAspect="1"/>
-          </p:cNvPicPr>
-          <p:nvPr/>
-        </p:nvPicPr>
-        <p:blipFill>
-          <a:blip r:embed="rId3"/>
-          <a:stretch>
-            <a:fillRect/>
-          </a:stretch>
-        </p:blipFill>
-        <p:spPr>
-          <a:xfrm>
-            <a:off x="600046" y="2085910"/>
-            <a:ext cx="10804139" cy="2846271"/>
-          </a:xfrm>
-          <a:prstGeom prst="rect">
-            <a:avLst/>
-          </a:prstGeom>
-        </p:spPr>
-      </p:pic>
-    </p:spTree>
-    <p:extLst>
-      <p:ext uri="{BB962C8B-B14F-4D97-AF65-F5344CB8AC3E}">
-        <p14:creationId xmlns:p14="http://schemas.microsoft.com/office/powerpoint/2010/main" val="225321888"/>
-      </p:ext>
-    </p:extLst>
-  </p:cSld>
-  <p:clrMapOvr>
-    <a:masterClrMapping/>
-  </p:clrMapOvr>
-</p:sld>
-</file>
-
-<file path=ppt/slides/slide35.xml><?xml version="1.0" encoding="utf-8"?>
-<p:sld xmlns:a="http://schemas.openxmlformats.org/drawingml/2006/main" xmlns:r="http://schemas.openxmlformats.org/officeDocument/2006/relationships" xmlns:p="http://schemas.openxmlformats.org/presentationml/2006/main">
-  <p:cSld>
-    <p:spTree>
-      <p:nvGrpSpPr>
-        <p:cNvPr id="1" name=""/>
-        <p:cNvGrpSpPr/>
-        <p:nvPr/>
-      </p:nvGrpSpPr>
-      <p:grpSpPr>
-        <a:xfrm>
-          <a:off x="0" y="0"/>
-          <a:ext cx="0" cy="0"/>
-          <a:chOff x="0" y="0"/>
-          <a:chExt cx="0" cy="0"/>
-        </a:xfrm>
-      </p:grpSpPr>
-      <p:sp>
-        <p:nvSpPr>
-          <p:cNvPr id="3" name="Slide Number Placeholder 2"/>
-          <p:cNvSpPr>
-            <a:spLocks noGrp="1"/>
-          </p:cNvSpPr>
-          <p:nvPr>
-            <p:ph type="sldNum" sz="quarter" idx="12"/>
-          </p:nvPr>
-        </p:nvSpPr>
-        <p:spPr/>
-        <p:txBody>
-          <a:bodyPr/>
-          <a:lstStyle/>
-          <a:p>
-            <a:fld id="{55670E94-029C-4BA8-8D44-FBB339E4924F}" type="slidenum">
-              <a:rPr lang="en-AU" smtClean="0">
-                <a:solidFill>
-                  <a:prstClr val="black">
-                    <a:tint val="75000"/>
-                  </a:prstClr>
-                </a:solidFill>
-              </a:rPr>
-              <a:pPr/>
-              <a:t>35</a:t>
-            </a:fld>
-            <a:endParaRPr lang="en-AU" dirty="0">
-              <a:solidFill>
-                <a:prstClr val="black">
-                  <a:tint val="75000"/>
-                </a:prstClr>
-              </a:solidFill>
-            </a:endParaRPr>
-          </a:p>
-        </p:txBody>
-      </p:sp>
-      <p:sp>
-        <p:nvSpPr>
-          <p:cNvPr id="5" name="Content Placeholder 1">
-            <a:extLst>
-              <a:ext uri="{FF2B5EF4-FFF2-40B4-BE49-F238E27FC236}">
-                <a16:creationId xmlns:a16="http://schemas.microsoft.com/office/drawing/2014/main" id="{08106222-633E-4F94-9E9F-49816C6A13D2}"/>
-              </a:ext>
-            </a:extLst>
-          </p:cNvPr>
-          <p:cNvSpPr>
-            <a:spLocks noGrp="1"/>
-          </p:cNvSpPr>
-          <p:nvPr>
-            <p:ph idx="1"/>
-          </p:nvPr>
-        </p:nvSpPr>
-        <p:spPr>
-          <a:xfrm>
-            <a:off x="164512" y="3220523"/>
-            <a:ext cx="11573831" cy="3435458"/>
-          </a:xfrm>
-        </p:spPr>
-        <p:txBody>
-          <a:bodyPr>
-            <a:normAutofit fontScale="92500" lnSpcReduction="10000"/>
-          </a:bodyPr>
-          <a:lstStyle/>
-          <a:p>
-            <a:pPr marL="450000" lvl="1" indent="0">
-              <a:buNone/>
-            </a:pPr>
-            <a:endParaRPr lang="en-AU" sz="2600" dirty="0"/>
-          </a:p>
-          <a:p>
-            <a:pPr lvl="1"/>
-            <a:r>
-              <a:rPr lang="en-AU" sz="2600" dirty="0"/>
-              <a:t>Hints: 1. figure out the representing code that is used by the text.</a:t>
-            </a:r>
-          </a:p>
-          <a:p>
-            <a:pPr lvl="6"/>
-            <a:r>
-              <a:rPr lang="en-AU" sz="2600" b="1" dirty="0"/>
-              <a:t>What code can generate a text with “=” at the end?</a:t>
-            </a:r>
-          </a:p>
-          <a:p>
-            <a:pPr lvl="6"/>
-            <a:r>
-              <a:rPr lang="en-AU" sz="2600" b="1" dirty="0"/>
-              <a:t>What code can generate a text of numbers 0-10 and letters A-F?</a:t>
-            </a:r>
-          </a:p>
-          <a:p>
-            <a:pPr marL="1458000" lvl="4" indent="0">
-              <a:buNone/>
-            </a:pPr>
-            <a:r>
-              <a:rPr lang="en-AU" sz="2600" dirty="0"/>
-              <a:t> 2. figure out the cipher that is used by the text</a:t>
-            </a:r>
-          </a:p>
-          <a:p>
-            <a:pPr lvl="6"/>
-            <a:r>
-              <a:rPr lang="en-AU" sz="2600" b="1" dirty="0"/>
-              <a:t>What cipher can generate a text with dots?</a:t>
-            </a:r>
-          </a:p>
-          <a:p>
-            <a:pPr lvl="6"/>
-            <a:r>
-              <a:rPr lang="en-AU" sz="2600" b="1" dirty="0"/>
-              <a:t>What cipher can generate a text with dots and dashes?</a:t>
-            </a:r>
-          </a:p>
-          <a:p>
-            <a:pPr marL="1458000" lvl="4" indent="0">
-              <a:buNone/>
-            </a:pPr>
-            <a:endParaRPr lang="en-AU" sz="2800" b="1" dirty="0"/>
-          </a:p>
-        </p:txBody>
-      </p:sp>
-      <p:sp>
-        <p:nvSpPr>
-          <p:cNvPr id="7" name="Title 3">
-            <a:extLst>
-              <a:ext uri="{FF2B5EF4-FFF2-40B4-BE49-F238E27FC236}">
-                <a16:creationId xmlns:a16="http://schemas.microsoft.com/office/drawing/2014/main" id="{7AF2CD78-8763-4C94-B120-CC8C0B08A844}"/>
-              </a:ext>
-            </a:extLst>
-          </p:cNvPr>
-          <p:cNvSpPr>
-            <a:spLocks noGrp="1"/>
-          </p:cNvSpPr>
-          <p:nvPr>
-            <p:ph type="title"/>
-          </p:nvPr>
-        </p:nvSpPr>
-        <p:spPr>
-          <a:xfrm>
-            <a:off x="1561495" y="0"/>
-            <a:ext cx="8725505" cy="1257300"/>
-          </a:xfrm>
-        </p:spPr>
-        <p:txBody>
-          <a:bodyPr/>
-          <a:lstStyle/>
-          <a:p>
-            <a:r>
-              <a:rPr lang="en-AU" dirty="0"/>
-              <a:t>Lab 2</a:t>
-            </a:r>
-          </a:p>
-        </p:txBody>
-      </p:sp>
-      <p:pic>
-        <p:nvPicPr>
-          <p:cNvPr id="8" name="Picture 7">
-            <a:extLst>
-              <a:ext uri="{FF2B5EF4-FFF2-40B4-BE49-F238E27FC236}">
-                <a16:creationId xmlns:a16="http://schemas.microsoft.com/office/drawing/2014/main" id="{295B203B-EABA-4B3A-8C49-1EF23705B34B}"/>
-              </a:ext>
-            </a:extLst>
-          </p:cNvPr>
-          <p:cNvPicPr>
-            <a:picLocks noChangeAspect="1"/>
-          </p:cNvPicPr>
-          <p:nvPr/>
-        </p:nvPicPr>
-        <p:blipFill>
-          <a:blip r:embed="rId3"/>
-          <a:stretch>
-            <a:fillRect/>
-          </a:stretch>
-        </p:blipFill>
-        <p:spPr>
-          <a:xfrm>
-            <a:off x="693930" y="1098111"/>
-            <a:ext cx="10804139" cy="2330890"/>
-          </a:xfrm>
-          <a:prstGeom prst="rect">
-            <a:avLst/>
-          </a:prstGeom>
-        </p:spPr>
-      </p:pic>
-      <p:sp>
-        <p:nvSpPr>
-          <p:cNvPr id="2" name="Oval 1">
-            <a:extLst>
-              <a:ext uri="{FF2B5EF4-FFF2-40B4-BE49-F238E27FC236}">
-                <a16:creationId xmlns:a16="http://schemas.microsoft.com/office/drawing/2014/main" id="{316ECDF0-7685-4013-947A-4C1A1640B3A7}"/>
-              </a:ext>
-            </a:extLst>
-          </p:cNvPr>
-          <p:cNvSpPr/>
-          <p:nvPr/>
-        </p:nvSpPr>
-        <p:spPr>
-          <a:xfrm flipH="1">
-            <a:off x="10544320" y="2263556"/>
-            <a:ext cx="953749" cy="1063256"/>
-          </a:xfrm>
-          <a:prstGeom prst="ellipse">
-            <a:avLst/>
-          </a:prstGeom>
-          <a:noFill/>
-          <a:ln w="34925">
-            <a:solidFill>
-              <a:srgbClr val="FF0000"/>
-            </a:solidFill>
-          </a:ln>
-        </p:spPr>
-        <p:style>
-          <a:lnRef idx="2">
-            <a:schemeClr val="accent1">
-              <a:shade val="50000"/>
-            </a:schemeClr>
-          </a:lnRef>
-          <a:fillRef idx="1">
-            <a:schemeClr val="accent1"/>
-          </a:fillRef>
-          <a:effectRef idx="0">
-            <a:schemeClr val="accent1"/>
-          </a:effectRef>
-          <a:fontRef idx="minor">
-            <a:schemeClr val="lt1"/>
-          </a:fontRef>
-        </p:style>
-        <p:txBody>
-          <a:bodyPr rtlCol="0" anchor="ctr"/>
-          <a:lstStyle/>
-          <a:p>
-            <a:pPr algn="ctr"/>
-            <a:endParaRPr lang="en-AU" sz="2400"/>
-          </a:p>
-        </p:txBody>
-      </p:sp>
-    </p:spTree>
-    <p:extLst>
-      <p:ext uri="{BB962C8B-B14F-4D97-AF65-F5344CB8AC3E}">
-        <p14:creationId xmlns:p14="http://schemas.microsoft.com/office/powerpoint/2010/main" val="1198541676"/>
       </p:ext>
     </p:extLst>
   </p:cSld>

</xml_diff>

<commit_message>
slides for week 3 updated
</commit_message>
<xml_diff>
--- a/cits1003-lecture_slides/CITS1003-3 NetworkAndComputers-exercises.pptx
+++ b/cits1003-lecture_slides/CITS1003-3 NetworkAndComputers-exercises.pptx
@@ -176,7 +176,7 @@
   <pc:docChgLst>
     <pc:chgData name="张 智" userId="36bdf691fd3510be" providerId="LiveId" clId="{140A1199-8952-4C15-ACCA-8E993F5FBFC6}"/>
     <pc:docChg chg="undo redo custSel addSld delSld modSld sldOrd">
-      <pc:chgData name="张 智" userId="36bdf691fd3510be" providerId="LiveId" clId="{140A1199-8952-4C15-ACCA-8E993F5FBFC6}" dt="2024-03-11T03:01:59.071" v="6715" actId="20577"/>
+      <pc:chgData name="张 智" userId="36bdf691fd3510be" providerId="LiveId" clId="{140A1199-8952-4C15-ACCA-8E993F5FBFC6}" dt="2024-03-11T06:12:00.865" v="7871" actId="20577"/>
       <pc:docMkLst>
         <pc:docMk/>
       </pc:docMkLst>
@@ -188,13 +188,13 @@
         </pc:sldMkLst>
       </pc:sldChg>
       <pc:sldChg chg="modSp mod modNotesTx">
-        <pc:chgData name="张 智" userId="36bdf691fd3510be" providerId="LiveId" clId="{140A1199-8952-4C15-ACCA-8E993F5FBFC6}" dt="2024-03-10T14:55:20.158" v="4040" actId="20577"/>
+        <pc:chgData name="张 智" userId="36bdf691fd3510be" providerId="LiveId" clId="{140A1199-8952-4C15-ACCA-8E993F5FBFC6}" dt="2024-03-11T04:57:51.379" v="7008" actId="20577"/>
         <pc:sldMkLst>
           <pc:docMk/>
           <pc:sldMk cId="523072554" sldId="408"/>
         </pc:sldMkLst>
         <pc:spChg chg="mod">
-          <ac:chgData name="张 智" userId="36bdf691fd3510be" providerId="LiveId" clId="{140A1199-8952-4C15-ACCA-8E993F5FBFC6}" dt="2024-03-09T14:10:13.132" v="88" actId="313"/>
+          <ac:chgData name="张 智" userId="36bdf691fd3510be" providerId="LiveId" clId="{140A1199-8952-4C15-ACCA-8E993F5FBFC6}" dt="2024-03-11T04:57:05.390" v="6985" actId="20577"/>
           <ac:spMkLst>
             <pc:docMk/>
             <pc:sldMk cId="523072554" sldId="408"/>
@@ -203,7 +203,7 @@
         </pc:spChg>
       </pc:sldChg>
       <pc:sldChg chg="addSp delSp modSp add del mod modAnim modNotesTx">
-        <pc:chgData name="张 智" userId="36bdf691fd3510be" providerId="LiveId" clId="{140A1199-8952-4C15-ACCA-8E993F5FBFC6}" dt="2024-03-11T02:01:37.450" v="6079" actId="20577"/>
+        <pc:chgData name="张 智" userId="36bdf691fd3510be" providerId="LiveId" clId="{140A1199-8952-4C15-ACCA-8E993F5FBFC6}" dt="2024-03-11T05:57:45.364" v="7788" actId="20577"/>
         <pc:sldMkLst>
           <pc:docMk/>
           <pc:sldMk cId="557833265" sldId="411"/>
@@ -256,9 +256,33 @@
             <ac:spMk id="12" creationId="{2A56023D-2EEC-4CB2-B440-50B78105640B}"/>
           </ac:spMkLst>
         </pc:spChg>
+        <pc:picChg chg="add mod">
+          <ac:chgData name="张 智" userId="36bdf691fd3510be" providerId="LiveId" clId="{140A1199-8952-4C15-ACCA-8E993F5FBFC6}" dt="2024-03-11T05:57:21.643" v="7770"/>
+          <ac:picMkLst>
+            <pc:docMk/>
+            <pc:sldMk cId="557833265" sldId="411"/>
+            <ac:picMk id="8" creationId="{6A77370A-B705-44A5-B00A-C7F6D90CC90C}"/>
+          </ac:picMkLst>
+        </pc:picChg>
+        <pc:picChg chg="add mod">
+          <ac:chgData name="张 智" userId="36bdf691fd3510be" providerId="LiveId" clId="{140A1199-8952-4C15-ACCA-8E993F5FBFC6}" dt="2024-03-11T05:57:21.643" v="7770"/>
+          <ac:picMkLst>
+            <pc:docMk/>
+            <pc:sldMk cId="557833265" sldId="411"/>
+            <ac:picMk id="9" creationId="{86D36B1A-CC5E-419F-B961-C02473532CD0}"/>
+          </ac:picMkLst>
+        </pc:picChg>
+        <pc:picChg chg="del">
+          <ac:chgData name="张 智" userId="36bdf691fd3510be" providerId="LiveId" clId="{140A1199-8952-4C15-ACCA-8E993F5FBFC6}" dt="2024-03-11T05:57:20.966" v="7769" actId="478"/>
+          <ac:picMkLst>
+            <pc:docMk/>
+            <pc:sldMk cId="557833265" sldId="411"/>
+            <ac:picMk id="10" creationId="{315A94EF-81AC-44F2-B5ED-3A290617E65C}"/>
+          </ac:picMkLst>
+        </pc:picChg>
       </pc:sldChg>
       <pc:sldChg chg="addSp modSp mod ord modNotesTx">
-        <pc:chgData name="张 智" userId="36bdf691fd3510be" providerId="LiveId" clId="{140A1199-8952-4C15-ACCA-8E993F5FBFC6}" dt="2024-03-10T15:02:32.184" v="4179" actId="20577"/>
+        <pc:chgData name="张 智" userId="36bdf691fd3510be" providerId="LiveId" clId="{140A1199-8952-4C15-ACCA-8E993F5FBFC6}" dt="2024-03-11T05:07:24.233" v="7100" actId="20577"/>
         <pc:sldMkLst>
           <pc:docMk/>
           <pc:sldMk cId="1229978770" sldId="470"/>
@@ -319,13 +343,13 @@
         </pc:spChg>
       </pc:sldChg>
       <pc:sldChg chg="modSp mod modNotesTx">
-        <pc:chgData name="张 智" userId="36bdf691fd3510be" providerId="LiveId" clId="{140A1199-8952-4C15-ACCA-8E993F5FBFC6}" dt="2024-03-11T02:30:12.360" v="6357" actId="20577"/>
+        <pc:chgData name="张 智" userId="36bdf691fd3510be" providerId="LiveId" clId="{140A1199-8952-4C15-ACCA-8E993F5FBFC6}" dt="2024-03-11T06:09:00.090" v="7862" actId="20577"/>
         <pc:sldMkLst>
           <pc:docMk/>
           <pc:sldMk cId="2338193120" sldId="487"/>
         </pc:sldMkLst>
         <pc:spChg chg="mod">
-          <ac:chgData name="张 智" userId="36bdf691fd3510be" providerId="LiveId" clId="{140A1199-8952-4C15-ACCA-8E993F5FBFC6}" dt="2024-03-11T02:30:08.795" v="6352" actId="20577"/>
+          <ac:chgData name="张 智" userId="36bdf691fd3510be" providerId="LiveId" clId="{140A1199-8952-4C15-ACCA-8E993F5FBFC6}" dt="2024-03-11T06:09:00.090" v="7862" actId="20577"/>
           <ac:spMkLst>
             <pc:docMk/>
             <pc:sldMk cId="2338193120" sldId="487"/>
@@ -363,7 +387,7 @@
         </pc:sldMkLst>
       </pc:sldChg>
       <pc:sldChg chg="modSp mod modNotesTx">
-        <pc:chgData name="张 智" userId="36bdf691fd3510be" providerId="LiveId" clId="{140A1199-8952-4C15-ACCA-8E993F5FBFC6}" dt="2024-03-11T01:53:34.532" v="5903" actId="20577"/>
+        <pc:chgData name="张 智" userId="36bdf691fd3510be" providerId="LiveId" clId="{140A1199-8952-4C15-ACCA-8E993F5FBFC6}" dt="2024-03-11T04:51:47.685" v="6812" actId="20577"/>
         <pc:sldMkLst>
           <pc:docMk/>
           <pc:sldMk cId="2206519697" sldId="500"/>
@@ -378,21 +402,21 @@
         </pc:spChg>
       </pc:sldChg>
       <pc:sldChg chg="modNotesTx">
-        <pc:chgData name="张 智" userId="36bdf691fd3510be" providerId="LiveId" clId="{140A1199-8952-4C15-ACCA-8E993F5FBFC6}" dt="2024-03-10T15:05:12.857" v="4201" actId="20577"/>
+        <pc:chgData name="张 智" userId="36bdf691fd3510be" providerId="LiveId" clId="{140A1199-8952-4C15-ACCA-8E993F5FBFC6}" dt="2024-03-11T05:10:58.999" v="7256"/>
         <pc:sldMkLst>
           <pc:docMk/>
           <pc:sldMk cId="1215651923" sldId="505"/>
         </pc:sldMkLst>
       </pc:sldChg>
       <pc:sldChg chg="modNotesTx">
-        <pc:chgData name="张 智" userId="36bdf691fd3510be" providerId="LiveId" clId="{140A1199-8952-4C15-ACCA-8E993F5FBFC6}" dt="2024-03-10T15:07:59.323" v="4211" actId="20577"/>
+        <pc:chgData name="张 智" userId="36bdf691fd3510be" providerId="LiveId" clId="{140A1199-8952-4C15-ACCA-8E993F5FBFC6}" dt="2024-03-11T05:15:01.975" v="7366" actId="20577"/>
         <pc:sldMkLst>
           <pc:docMk/>
           <pc:sldMk cId="396170795" sldId="506"/>
         </pc:sldMkLst>
       </pc:sldChg>
-      <pc:sldChg chg="modSp mod modAnim modNotesTx">
-        <pc:chgData name="张 智" userId="36bdf691fd3510be" providerId="LiveId" clId="{140A1199-8952-4C15-ACCA-8E993F5FBFC6}" dt="2024-03-11T00:57:43.712" v="4579" actId="20577"/>
+      <pc:sldChg chg="addSp modSp mod modAnim modNotesTx">
+        <pc:chgData name="张 智" userId="36bdf691fd3510be" providerId="LiveId" clId="{140A1199-8952-4C15-ACCA-8E993F5FBFC6}" dt="2024-03-11T05:29:44.153" v="7483" actId="14100"/>
         <pc:sldMkLst>
           <pc:docMk/>
           <pc:sldMk cId="4030956127" sldId="507"/>
@@ -413,6 +437,22 @@
             <ac:spMk id="8" creationId="{EFF2A714-4BFE-4265-87E4-34F8FECB8F6F}"/>
           </ac:spMkLst>
         </pc:spChg>
+        <pc:picChg chg="add mod">
+          <ac:chgData name="张 智" userId="36bdf691fd3510be" providerId="LiveId" clId="{140A1199-8952-4C15-ACCA-8E993F5FBFC6}" dt="2024-03-11T05:29:44.153" v="7483" actId="14100"/>
+          <ac:picMkLst>
+            <pc:docMk/>
+            <pc:sldMk cId="4030956127" sldId="507"/>
+            <ac:picMk id="5" creationId="{ACDBE6DC-10D8-4C31-A67A-1D55E0AD97AE}"/>
+          </ac:picMkLst>
+        </pc:picChg>
+        <pc:picChg chg="mod">
+          <ac:chgData name="张 智" userId="36bdf691fd3510be" providerId="LiveId" clId="{140A1199-8952-4C15-ACCA-8E993F5FBFC6}" dt="2024-03-11T05:29:22.825" v="7479" actId="14100"/>
+          <ac:picMkLst>
+            <pc:docMk/>
+            <pc:sldMk cId="4030956127" sldId="507"/>
+            <ac:picMk id="6" creationId="{C99C090E-9917-483F-953D-653476C52CB4}"/>
+          </ac:picMkLst>
+        </pc:picChg>
       </pc:sldChg>
       <pc:sldChg chg="modSp mod modNotesTx">
         <pc:chgData name="张 智" userId="36bdf691fd3510be" providerId="LiveId" clId="{140A1199-8952-4C15-ACCA-8E993F5FBFC6}" dt="2024-03-11T00:52:32.459" v="4528" actId="20577"/>
@@ -430,7 +470,7 @@
         </pc:spChg>
       </pc:sldChg>
       <pc:sldChg chg="modSp mod modNotesTx">
-        <pc:chgData name="张 智" userId="36bdf691fd3510be" providerId="LiveId" clId="{140A1199-8952-4C15-ACCA-8E993F5FBFC6}" dt="2024-03-11T01:14:36.849" v="4891" actId="20577"/>
+        <pc:chgData name="张 智" userId="36bdf691fd3510be" providerId="LiveId" clId="{140A1199-8952-4C15-ACCA-8E993F5FBFC6}" dt="2024-03-11T05:40:06.718" v="7740" actId="20577"/>
         <pc:sldMkLst>
           <pc:docMk/>
           <pc:sldMk cId="3009154310" sldId="509"/>
@@ -445,7 +485,7 @@
         </pc:spChg>
       </pc:sldChg>
       <pc:sldChg chg="modNotesTx">
-        <pc:chgData name="张 智" userId="36bdf691fd3510be" providerId="LiveId" clId="{140A1199-8952-4C15-ACCA-8E993F5FBFC6}" dt="2024-03-11T01:36:54.531" v="5096" actId="20577"/>
+        <pc:chgData name="张 智" userId="36bdf691fd3510be" providerId="LiveId" clId="{140A1199-8952-4C15-ACCA-8E993F5FBFC6}" dt="2024-03-11T05:52:03.136" v="7768" actId="20577"/>
         <pc:sldMkLst>
           <pc:docMk/>
           <pc:sldMk cId="3311076584" sldId="510"/>
@@ -482,7 +522,7 @@
         </pc:spChg>
       </pc:sldChg>
       <pc:sldChg chg="addSp delSp modSp mod modNotesTx">
-        <pc:chgData name="张 智" userId="36bdf691fd3510be" providerId="LiveId" clId="{140A1199-8952-4C15-ACCA-8E993F5FBFC6}" dt="2024-03-11T02:21:01.821" v="6295" actId="5793"/>
+        <pc:chgData name="张 智" userId="36bdf691fd3510be" providerId="LiveId" clId="{140A1199-8952-4C15-ACCA-8E993F5FBFC6}" dt="2024-03-11T06:04:30.372" v="7845" actId="20577"/>
         <pc:sldMkLst>
           <pc:docMk/>
           <pc:sldMk cId="1300143618" sldId="514"/>
@@ -552,7 +592,7 @@
         </pc:spChg>
       </pc:sldChg>
       <pc:sldChg chg="modSp mod modNotesTx">
-        <pc:chgData name="张 智" userId="36bdf691fd3510be" providerId="LiveId" clId="{140A1199-8952-4C15-ACCA-8E993F5FBFC6}" dt="2024-03-11T02:30:54.663" v="6359" actId="20577"/>
+        <pc:chgData name="张 智" userId="36bdf691fd3510be" providerId="LiveId" clId="{140A1199-8952-4C15-ACCA-8E993F5FBFC6}" dt="2024-03-11T06:10:00.661" v="7866" actId="20577"/>
         <pc:sldMkLst>
           <pc:docMk/>
           <pc:sldMk cId="276341393" sldId="516"/>
@@ -634,13 +674,13 @@
         </pc:spChg>
       </pc:sldChg>
       <pc:sldChg chg="modSp mod modNotesTx">
-        <pc:chgData name="张 智" userId="36bdf691fd3510be" providerId="LiveId" clId="{140A1199-8952-4C15-ACCA-8E993F5FBFC6}" dt="2024-03-10T15:15:40.335" v="4436" actId="20577"/>
+        <pc:chgData name="张 智" userId="36bdf691fd3510be" providerId="LiveId" clId="{140A1199-8952-4C15-ACCA-8E993F5FBFC6}" dt="2024-03-11T05:17:33.804" v="7371" actId="20577"/>
         <pc:sldMkLst>
           <pc:docMk/>
           <pc:sldMk cId="38315641" sldId="525"/>
         </pc:sldMkLst>
         <pc:spChg chg="mod">
-          <ac:chgData name="张 智" userId="36bdf691fd3510be" providerId="LiveId" clId="{140A1199-8952-4C15-ACCA-8E993F5FBFC6}" dt="2024-03-10T15:14:10.796" v="4366" actId="20577"/>
+          <ac:chgData name="张 智" userId="36bdf691fd3510be" providerId="LiveId" clId="{140A1199-8952-4C15-ACCA-8E993F5FBFC6}" dt="2024-03-11T05:17:33.804" v="7371" actId="20577"/>
           <ac:spMkLst>
             <pc:docMk/>
             <pc:sldMk cId="38315641" sldId="525"/>
@@ -649,13 +689,13 @@
         </pc:spChg>
       </pc:sldChg>
       <pc:sldChg chg="modSp mod modNotesTx">
-        <pc:chgData name="张 智" userId="36bdf691fd3510be" providerId="LiveId" clId="{140A1199-8952-4C15-ACCA-8E993F5FBFC6}" dt="2024-03-10T08:04:37.984" v="1327" actId="20577"/>
+        <pc:chgData name="张 智" userId="36bdf691fd3510be" providerId="LiveId" clId="{140A1199-8952-4C15-ACCA-8E993F5FBFC6}" dt="2024-03-11T05:38:23.873" v="7712" actId="20577"/>
         <pc:sldMkLst>
           <pc:docMk/>
           <pc:sldMk cId="1156741083" sldId="526"/>
         </pc:sldMkLst>
         <pc:spChg chg="mod">
-          <ac:chgData name="张 智" userId="36bdf691fd3510be" providerId="LiveId" clId="{140A1199-8952-4C15-ACCA-8E993F5FBFC6}" dt="2024-03-10T08:04:35.841" v="1325" actId="20577"/>
+          <ac:chgData name="张 智" userId="36bdf691fd3510be" providerId="LiveId" clId="{140A1199-8952-4C15-ACCA-8E993F5FBFC6}" dt="2024-03-11T05:36:50.185" v="7683" actId="20577"/>
           <ac:spMkLst>
             <pc:docMk/>
             <pc:sldMk cId="1156741083" sldId="526"/>
@@ -664,13 +704,13 @@
         </pc:spChg>
       </pc:sldChg>
       <pc:sldChg chg="modSp mod modNotesTx">
-        <pc:chgData name="张 智" userId="36bdf691fd3510be" providerId="LiveId" clId="{140A1199-8952-4C15-ACCA-8E993F5FBFC6}" dt="2024-03-11T02:18:39.989" v="6286" actId="20577"/>
+        <pc:chgData name="张 智" userId="36bdf691fd3510be" providerId="LiveId" clId="{140A1199-8952-4C15-ACCA-8E993F5FBFC6}" dt="2024-03-11T05:59:45.547" v="7835" actId="20577"/>
         <pc:sldMkLst>
           <pc:docMk/>
           <pc:sldMk cId="2455204925" sldId="527"/>
         </pc:sldMkLst>
         <pc:spChg chg="mod">
-          <ac:chgData name="张 智" userId="36bdf691fd3510be" providerId="LiveId" clId="{140A1199-8952-4C15-ACCA-8E993F5FBFC6}" dt="2024-03-11T02:17:33.121" v="6274" actId="20577"/>
+          <ac:chgData name="张 智" userId="36bdf691fd3510be" providerId="LiveId" clId="{140A1199-8952-4C15-ACCA-8E993F5FBFC6}" dt="2024-03-11T05:59:10.711" v="7825" actId="14100"/>
           <ac:spMkLst>
             <pc:docMk/>
             <pc:sldMk cId="2455204925" sldId="527"/>
@@ -686,13 +726,13 @@
         </pc:sldMkLst>
       </pc:sldChg>
       <pc:sldChg chg="modSp add mod modNotesTx">
-        <pc:chgData name="张 智" userId="36bdf691fd3510be" providerId="LiveId" clId="{140A1199-8952-4C15-ACCA-8E993F5FBFC6}" dt="2024-03-10T14:58:46.493" v="4044" actId="20577"/>
+        <pc:chgData name="张 智" userId="36bdf691fd3510be" providerId="LiveId" clId="{140A1199-8952-4C15-ACCA-8E993F5FBFC6}" dt="2024-03-11T05:03:10.883" v="7014" actId="20577"/>
         <pc:sldMkLst>
           <pc:docMk/>
           <pc:sldMk cId="2977176716" sldId="529"/>
         </pc:sldMkLst>
         <pc:spChg chg="mod">
-          <ac:chgData name="张 智" userId="36bdf691fd3510be" providerId="LiveId" clId="{140A1199-8952-4C15-ACCA-8E993F5FBFC6}" dt="2024-03-09T14:11:09.750" v="159" actId="15"/>
+          <ac:chgData name="张 智" userId="36bdf691fd3510be" providerId="LiveId" clId="{140A1199-8952-4C15-ACCA-8E993F5FBFC6}" dt="2024-03-11T05:00:40.384" v="7012" actId="207"/>
           <ac:spMkLst>
             <pc:docMk/>
             <pc:sldMk cId="2977176716" sldId="529"/>
@@ -701,7 +741,7 @@
         </pc:spChg>
       </pc:sldChg>
       <pc:sldChg chg="modSp add mod modNotesTx">
-        <pc:chgData name="张 智" userId="36bdf691fd3510be" providerId="LiveId" clId="{140A1199-8952-4C15-ACCA-8E993F5FBFC6}" dt="2024-03-10T14:59:52.227" v="4065" actId="20577"/>
+        <pc:chgData name="张 智" userId="36bdf691fd3510be" providerId="LiveId" clId="{140A1199-8952-4C15-ACCA-8E993F5FBFC6}" dt="2024-03-11T05:05:07.748" v="7015" actId="20577"/>
         <pc:sldMkLst>
           <pc:docMk/>
           <pc:sldMk cId="2998016790" sldId="530"/>
@@ -747,13 +787,13 @@
         </pc:spChg>
       </pc:sldChg>
       <pc:sldChg chg="modSp add mod modNotesTx">
-        <pc:chgData name="张 智" userId="36bdf691fd3510be" providerId="LiveId" clId="{140A1199-8952-4C15-ACCA-8E993F5FBFC6}" dt="2024-03-11T01:11:14.695" v="4780" actId="20577"/>
+        <pc:chgData name="张 智" userId="36bdf691fd3510be" providerId="LiveId" clId="{140A1199-8952-4C15-ACCA-8E993F5FBFC6}" dt="2024-03-11T05:39:13.280" v="7713" actId="20577"/>
         <pc:sldMkLst>
           <pc:docMk/>
           <pc:sldMk cId="3201477769" sldId="532"/>
         </pc:sldMkLst>
         <pc:spChg chg="mod">
-          <ac:chgData name="张 智" userId="36bdf691fd3510be" providerId="LiveId" clId="{140A1199-8952-4C15-ACCA-8E993F5FBFC6}" dt="2024-03-11T01:06:57.012" v="4603" actId="207"/>
+          <ac:chgData name="张 智" userId="36bdf691fd3510be" providerId="LiveId" clId="{140A1199-8952-4C15-ACCA-8E993F5FBFC6}" dt="2024-03-11T05:36:55.426" v="7686" actId="20577"/>
           <ac:spMkLst>
             <pc:docMk/>
             <pc:sldMk cId="3201477769" sldId="532"/>
@@ -762,7 +802,7 @@
         </pc:spChg>
       </pc:sldChg>
       <pc:sldChg chg="add modNotesTx">
-        <pc:chgData name="张 智" userId="36bdf691fd3510be" providerId="LiveId" clId="{140A1199-8952-4C15-ACCA-8E993F5FBFC6}" dt="2024-03-11T01:18:32.507" v="5048" actId="20577"/>
+        <pc:chgData name="张 智" userId="36bdf691fd3510be" providerId="LiveId" clId="{140A1199-8952-4C15-ACCA-8E993F5FBFC6}" dt="2024-03-11T05:42:27.485" v="7741" actId="20577"/>
         <pc:sldMkLst>
           <pc:docMk/>
           <pc:sldMk cId="946066406" sldId="533"/>
@@ -776,7 +816,7 @@
         </pc:sldMkLst>
       </pc:sldChg>
       <pc:sldChg chg="addSp delSp modSp add mod modAnim modNotesTx">
-        <pc:chgData name="张 智" userId="36bdf691fd3510be" providerId="LiveId" clId="{140A1199-8952-4C15-ACCA-8E993F5FBFC6}" dt="2024-03-11T01:22:23.546" v="5050" actId="207"/>
+        <pc:chgData name="张 智" userId="36bdf691fd3510be" providerId="LiveId" clId="{140A1199-8952-4C15-ACCA-8E993F5FBFC6}" dt="2024-03-11T05:43:18.155" v="7747" actId="20577"/>
         <pc:sldMkLst>
           <pc:docMk/>
           <pc:sldMk cId="3727019504" sldId="534"/>
@@ -838,7 +878,7 @@
         </pc:spChg>
       </pc:sldChg>
       <pc:sldChg chg="addSp delSp modSp add mod modNotesTx">
-        <pc:chgData name="张 智" userId="36bdf691fd3510be" providerId="LiveId" clId="{140A1199-8952-4C15-ACCA-8E993F5FBFC6}" dt="2024-03-11T01:29:54.002" v="5054" actId="20577"/>
+        <pc:chgData name="张 智" userId="36bdf691fd3510be" providerId="LiveId" clId="{140A1199-8952-4C15-ACCA-8E993F5FBFC6}" dt="2024-03-11T05:47:57.012" v="7765" actId="20577"/>
         <pc:sldMkLst>
           <pc:docMk/>
           <pc:sldMk cId="51452464" sldId="1512"/>
@@ -936,7 +976,7 @@
         </pc:spChg>
       </pc:sldChg>
       <pc:sldChg chg="addSp delSp modSp add mod modNotesTx">
-        <pc:chgData name="张 智" userId="36bdf691fd3510be" providerId="LiveId" clId="{140A1199-8952-4C15-ACCA-8E993F5FBFC6}" dt="2024-03-11T02:36:03.265" v="6423" actId="20577"/>
+        <pc:chgData name="张 智" userId="36bdf691fd3510be" providerId="LiveId" clId="{140A1199-8952-4C15-ACCA-8E993F5FBFC6}" dt="2024-03-11T06:12:00.865" v="7871" actId="20577"/>
         <pc:sldMkLst>
           <pc:docMk/>
           <pc:sldMk cId="3162538860" sldId="1517"/>
@@ -12383,7 +12423,7 @@
           </a:effectLst>
           <a:extLst>
             <a:ext uri="{91240B29-F687-4f45-9708-019B960494DF}">
-              <a14:hiddenLine xmlns="" xmlns:a14="http://schemas.microsoft.com/office/drawing/2010/main" xmlns:p14="http://schemas.microsoft.com/office/powerpoint/2010/main" xmlns:a16="http://schemas.microsoft.com/office/drawing/2014/main" w="9525">
+              <a14:hiddenLine xmlns:a16="http://schemas.microsoft.com/office/drawing/2014/main" xmlns:p14="http://schemas.microsoft.com/office/powerpoint/2010/main" xmlns:a14="http://schemas.microsoft.com/office/drawing/2010/main" xmlns="" w="9525">
                 <a:solidFill>
                   <a:srgbClr val="000000"/>
                 </a:solidFill>
@@ -12981,7 +13021,7 @@
             <a:pPr lvl="1"/>
             <a:r>
               <a:rPr lang="en-AU" sz="2800" dirty="0"/>
-              <a:t>Is https 100% secure given it has mathematical proof?</a:t>
+              <a:t>Is https 100% secure given that it has mathematical proof?</a:t>
             </a:r>
           </a:p>
           <a:p>
@@ -13888,7 +13928,7 @@
         <p:spPr>
           <a:xfrm>
             <a:off x="913795" y="1433945"/>
-            <a:ext cx="10495139" cy="3813916"/>
+            <a:ext cx="7098091" cy="2985655"/>
           </a:xfrm>
           <a:prstGeom prst="rect">
             <a:avLst/>
@@ -14051,6 +14091,36 @@
           </a:p>
         </p:txBody>
       </p:sp>
+      <p:pic>
+        <p:nvPicPr>
+          <p:cNvPr id="5" name="Picture 4">
+            <a:extLst>
+              <a:ext uri="{FF2B5EF4-FFF2-40B4-BE49-F238E27FC236}">
+                <a16:creationId xmlns:a16="http://schemas.microsoft.com/office/drawing/2014/main" id="{ACDBE6DC-10D8-4C31-A67A-1D55E0AD97AE}"/>
+              </a:ext>
+            </a:extLst>
+          </p:cNvPr>
+          <p:cNvPicPr>
+            <a:picLocks noChangeAspect="1"/>
+          </p:cNvPicPr>
+          <p:nvPr/>
+        </p:nvPicPr>
+        <p:blipFill>
+          <a:blip r:embed="rId4"/>
+          <a:stretch>
+            <a:fillRect/>
+          </a:stretch>
+        </p:blipFill>
+        <p:spPr>
+          <a:xfrm>
+            <a:off x="913795" y="4576212"/>
+            <a:ext cx="2025348" cy="847843"/>
+          </a:xfrm>
+          <a:prstGeom prst="rect">
+            <a:avLst/>
+          </a:prstGeom>
+        </p:spPr>
+      </p:pic>
     </p:spTree>
     <p:extLst>
       <p:ext uri="{BB962C8B-B14F-4D97-AF65-F5344CB8AC3E}">
@@ -14163,7 +14233,7 @@
         <p:spPr>
           <a:xfrm>
             <a:off x="810623" y="1834163"/>
-            <a:ext cx="10353762" cy="4792971"/>
+            <a:ext cx="10750006" cy="4792971"/>
           </a:xfrm>
         </p:spPr>
         <p:txBody>
@@ -14182,7 +14252,7 @@
             </a:r>
             <a:r>
               <a:rPr lang="en-US" sz="2800" dirty="0"/>
-              <a:t> with VM’s IP address</a:t>
+              <a:t> (source file) with VM’s IP address</a:t>
             </a:r>
           </a:p>
           <a:p>
@@ -14201,14 +14271,14 @@
             </a:r>
             <a:r>
               <a:rPr lang="en-US" sz="2800" dirty="0"/>
-              <a:t>, update the IP address.</a:t>
+              <a:t>, update the IP address with your VM’s IP address.</a:t>
             </a:r>
           </a:p>
           <a:p>
             <a:pPr lvl="1"/>
             <a:r>
               <a:rPr lang="en-US" sz="2800" dirty="0"/>
-              <a:t>How to find the IP address? </a:t>
+              <a:t>How to find your VM’s IP address? </a:t>
             </a:r>
           </a:p>
           <a:p>
@@ -14368,7 +14438,7 @@
             <a:pPr lvl="1"/>
             <a:r>
               <a:rPr lang="en-US" sz="2800" dirty="0"/>
-              <a:t>How to find the IP address?</a:t>
+              <a:t>How to find your VM’s IP address?</a:t>
             </a:r>
           </a:p>
           <a:p>
@@ -16720,36 +16790,6 @@
           </a:p>
         </p:txBody>
       </p:sp>
-      <p:pic>
-        <p:nvPicPr>
-          <p:cNvPr id="10" name="Picture 9">
-            <a:extLst>
-              <a:ext uri="{FF2B5EF4-FFF2-40B4-BE49-F238E27FC236}">
-                <a16:creationId xmlns:a16="http://schemas.microsoft.com/office/drawing/2014/main" id="{315A94EF-81AC-44F2-B5ED-3A290617E65C}"/>
-              </a:ext>
-            </a:extLst>
-          </p:cNvPr>
-          <p:cNvPicPr>
-            <a:picLocks noChangeAspect="1"/>
-          </p:cNvPicPr>
-          <p:nvPr/>
-        </p:nvPicPr>
-        <p:blipFill>
-          <a:blip r:embed="rId3"/>
-          <a:stretch>
-            <a:fillRect/>
-          </a:stretch>
-        </p:blipFill>
-        <p:spPr>
-          <a:xfrm>
-            <a:off x="913795" y="1433945"/>
-            <a:ext cx="10495139" cy="3813916"/>
-          </a:xfrm>
-          <a:prstGeom prst="rect">
-            <a:avLst/>
-          </a:prstGeom>
-        </p:spPr>
-      </p:pic>
       <p:sp>
         <p:nvSpPr>
           <p:cNvPr id="11" name="Title 3">
@@ -17003,6 +17043,66 @@
           </a:p>
         </p:txBody>
       </p:sp>
+      <p:pic>
+        <p:nvPicPr>
+          <p:cNvPr id="8" name="Picture 7">
+            <a:extLst>
+              <a:ext uri="{FF2B5EF4-FFF2-40B4-BE49-F238E27FC236}">
+                <a16:creationId xmlns:a16="http://schemas.microsoft.com/office/drawing/2014/main" id="{6A77370A-B705-44A5-B00A-C7F6D90CC90C}"/>
+              </a:ext>
+            </a:extLst>
+          </p:cNvPr>
+          <p:cNvPicPr>
+            <a:picLocks noChangeAspect="1"/>
+          </p:cNvPicPr>
+          <p:nvPr/>
+        </p:nvPicPr>
+        <p:blipFill>
+          <a:blip r:embed="rId3"/>
+          <a:stretch>
+            <a:fillRect/>
+          </a:stretch>
+        </p:blipFill>
+        <p:spPr>
+          <a:xfrm>
+            <a:off x="913795" y="1433945"/>
+            <a:ext cx="7098091" cy="2985655"/>
+          </a:xfrm>
+          <a:prstGeom prst="rect">
+            <a:avLst/>
+          </a:prstGeom>
+        </p:spPr>
+      </p:pic>
+      <p:pic>
+        <p:nvPicPr>
+          <p:cNvPr id="9" name="Picture 8">
+            <a:extLst>
+              <a:ext uri="{FF2B5EF4-FFF2-40B4-BE49-F238E27FC236}">
+                <a16:creationId xmlns:a16="http://schemas.microsoft.com/office/drawing/2014/main" id="{86D36B1A-CC5E-419F-B961-C02473532CD0}"/>
+              </a:ext>
+            </a:extLst>
+          </p:cNvPr>
+          <p:cNvPicPr>
+            <a:picLocks noChangeAspect="1"/>
+          </p:cNvPicPr>
+          <p:nvPr/>
+        </p:nvPicPr>
+        <p:blipFill>
+          <a:blip r:embed="rId4"/>
+          <a:stretch>
+            <a:fillRect/>
+          </a:stretch>
+        </p:blipFill>
+        <p:spPr>
+          <a:xfrm>
+            <a:off x="913795" y="4576212"/>
+            <a:ext cx="2025348" cy="847843"/>
+          </a:xfrm>
+          <a:prstGeom prst="rect">
+            <a:avLst/>
+          </a:prstGeom>
+        </p:spPr>
+      </p:pic>
     </p:spTree>
     <p:extLst>
       <p:ext uri="{BB962C8B-B14F-4D97-AF65-F5344CB8AC3E}">
@@ -17115,7 +17215,7 @@
         <p:spPr>
           <a:xfrm>
             <a:off x="810623" y="1834163"/>
-            <a:ext cx="10353762" cy="4792971"/>
+            <a:ext cx="10456934" cy="4792971"/>
           </a:xfrm>
         </p:spPr>
         <p:txBody>
@@ -17153,7 +17253,7 @@
             </a:r>
             <a:r>
               <a:rPr lang="en-US" sz="2800" dirty="0"/>
-              <a:t>, update the IP address of 10.0.2.15</a:t>
+              <a:t>, update the IP address with your VM’s IP address</a:t>
             </a:r>
           </a:p>
           <a:p>
@@ -18255,6 +18355,20 @@
             </a:r>
           </a:p>
           <a:p>
+            <a:pPr lvl="1"/>
+            <a:r>
+              <a:rPr lang="en-AU" sz="2600" dirty="0"/>
+              <a:t>active attack: an attacker interacts with the victim system</a:t>
+            </a:r>
+          </a:p>
+          <a:p>
+            <a:pPr lvl="1"/>
+            <a:r>
+              <a:rPr lang="en-AU" sz="2600" dirty="0"/>
+              <a:t>passive attack: an attacker does not need the interaction</a:t>
+            </a:r>
+          </a:p>
+          <a:p>
             <a:r>
               <a:rPr lang="en-AU" sz="2800" dirty="0"/>
               <a:t>What is it: capture network traffic between two communicating nodes</a:t>
@@ -18726,7 +18840,7 @@
           <a:p>
             <a:r>
               <a:rPr lang="en-AU" sz="2800" dirty="0"/>
-              <a:t>Malicious clients can exploit a weakness in their normal connection with the server to gain unauthorized access, thus executing commands on the server. </a:t>
+              <a:t>Malicious clients can exploit a weakness in their normal connection with the server to gain unauthorized access, thus executing arbitrary commands on the server. </a:t>
             </a:r>
           </a:p>
           <a:p>
@@ -19956,7 +20070,7 @@
             <a:r>
               <a:rPr lang="en-AU" sz="2800" b="1" dirty="0">
                 <a:solidFill>
-                  <a:srgbClr val="FF0000"/>
+                  <a:schemeClr val="tx1"/>
                 </a:solidFill>
               </a:rPr>
               <a:t>passive</a:t>
@@ -19986,15 +20100,31 @@
           <a:p>
             <a:pPr lvl="1"/>
             <a:r>
+              <a:rPr lang="en-AU" sz="2600" dirty="0">
+                <a:solidFill>
+                  <a:srgbClr val="FF0000"/>
+                </a:solidFill>
+              </a:rPr>
+              <a:t>Detection</a:t>
+            </a:r>
+            <a:r>
               <a:rPr lang="en-AU" sz="2600" dirty="0"/>
-              <a:t>Detection: hard to detect such attacks, as the attack does not leave any traces in the network.</a:t>
+              <a:t>: hard to detect such attacks, as the attack does not leave any traces in the network.</a:t>
             </a:r>
           </a:p>
           <a:p>
             <a:pPr lvl="1"/>
             <a:r>
+              <a:rPr lang="en-AU" sz="2600" dirty="0">
+                <a:solidFill>
+                  <a:srgbClr val="FF0000"/>
+                </a:solidFill>
+              </a:rPr>
+              <a:t>Prevention</a:t>
+            </a:r>
+            <a:r>
               <a:rPr lang="en-AU" sz="2600" dirty="0"/>
-              <a:t>Prevention: can be prevented via </a:t>
+              <a:t>: can be prevented via </a:t>
             </a:r>
             <a:r>
               <a:rPr lang="en-AU" sz="2600" dirty="0">

</xml_diff>